<commit_message>
some digital poster stuff
</commit_message>
<xml_diff>
--- a/ismrm_final/digital_poster/Digital_Poster_Template_2025.pptx
+++ b/ismrm_final/digital_poster/Digital_Poster_Template_2025.pptx
@@ -1135,26 +1135,38 @@
           <a:p>
             <a:r>
               <a:rPr lang="en-US" dirty="0"/>
-              <a:t>A disclosure slide is optional but encouraged if you do have potential conflicts to disclose.</a:t>
-            </a:r>
-          </a:p>
-          <a:p>
-            <a:endParaRPr lang="en-US" dirty="0"/>
-          </a:p>
-          <a:p>
+              <a:t>A disclosure slide is optional but </a:t>
+            </a:r>
+            <a:r>
+              <a:rPr lang="en-US" dirty="0" smtClean="0"/>
+              <a:t>encouraged </a:t>
+            </a:r>
             <a:r>
               <a:rPr lang="en-US" dirty="0"/>
+              <a:t>if you do have potential conflicts to disclose</a:t>
+            </a:r>
+            <a:r>
+              <a:rPr lang="en-US" dirty="0" smtClean="0"/>
+              <a:t>.</a:t>
+            </a:r>
+          </a:p>
+          <a:p>
+            <a:endParaRPr lang="en-US" dirty="0" smtClean="0"/>
+          </a:p>
+          <a:p>
+            <a:r>
+              <a:rPr lang="en-US" dirty="0" smtClean="0"/>
               <a:t>A variety of PowerPoint templates for this slide are available</a:t>
             </a:r>
             <a:r>
-              <a:rPr lang="en-US" baseline="0" dirty="0"/>
+              <a:rPr lang="en-US" baseline="0" dirty="0" smtClean="0"/>
               <a:t> on the Guidelines page under the Declaration Slides tab:</a:t>
             </a:r>
             <a:br>
-              <a:rPr lang="en-US" baseline="0" dirty="0"/>
+              <a:rPr lang="en-US" baseline="0" dirty="0" smtClean="0"/>
             </a:br>
             <a:r>
-              <a:rPr lang="en-US" baseline="0" dirty="0"/>
+              <a:rPr lang="en-US" baseline="0" dirty="0" smtClean="0"/>
               <a:t>https://www.ismrm.org/25m/guidelines/</a:t>
             </a:r>
             <a:endParaRPr lang="en-US" dirty="0"/>
@@ -2859,7 +2871,7 @@
                 </a:solidFill>
               </a:rPr>
               <a:pPr/>
-              <a:t>4/28/2025</a:t>
+              <a:t>3/13/2025</a:t>
             </a:fld>
             <a:endParaRPr lang="en-US">
               <a:solidFill>
@@ -4430,7 +4442,7 @@
           </a:ln>
           <a:extLst>
             <a:ext uri="{C572A759-6A51-4108-AA02-DFA0A04FC94B}">
-              <ma14:wrappingTextBoxFlag xmlns:ma14="http://schemas.microsoft.com/office/mac/drawingml/2011/main" xmlns:a14="http://schemas.microsoft.com/office/drawing/2010/main" xmlns:m="http://schemas.openxmlformats.org/officeDocument/2006/math" xmlns="" val="1"/>
+              <ma14:wrappingTextBoxFlag xmlns="" xmlns:m="http://schemas.openxmlformats.org/officeDocument/2006/math" xmlns:a14="http://schemas.microsoft.com/office/drawing/2010/main" xmlns:ma14="http://schemas.microsoft.com/office/mac/drawingml/2011/main" val="1"/>
             </a:ext>
           </a:extLst>
         </p:spPr>
@@ -4469,7 +4481,7 @@
           </a:ln>
           <a:extLst>
             <a:ext uri="{C572A759-6A51-4108-AA02-DFA0A04FC94B}">
-              <ma14:wrappingTextBoxFlag xmlns:ma14="http://schemas.microsoft.com/office/mac/drawingml/2011/main" xmlns:a14="http://schemas.microsoft.com/office/drawing/2010/main" xmlns:m="http://schemas.openxmlformats.org/officeDocument/2006/math" xmlns="" val="1"/>
+              <ma14:wrappingTextBoxFlag xmlns="" xmlns:m="http://schemas.openxmlformats.org/officeDocument/2006/math" xmlns:a14="http://schemas.microsoft.com/office/drawing/2010/main" xmlns:ma14="http://schemas.microsoft.com/office/mac/drawingml/2011/main" val="1"/>
             </a:ext>
           </a:extLst>
         </p:spPr>
@@ -5588,7 +5600,7 @@
           </a:ln>
           <a:extLst>
             <a:ext uri="{C572A759-6A51-4108-AA02-DFA0A04FC94B}">
-              <ma14:wrappingTextBoxFlag xmlns:ma14="http://schemas.microsoft.com/office/mac/drawingml/2011/main" xmlns:a14="http://schemas.microsoft.com/office/drawing/2010/main" xmlns:m="http://schemas.openxmlformats.org/officeDocument/2006/math" xmlns="" val="1"/>
+              <ma14:wrappingTextBoxFlag xmlns="" xmlns:m="http://schemas.openxmlformats.org/officeDocument/2006/math" xmlns:a14="http://schemas.microsoft.com/office/drawing/2010/main" xmlns:ma14="http://schemas.microsoft.com/office/mac/drawingml/2011/main" val="1"/>
             </a:ext>
           </a:extLst>
         </p:spPr>
@@ -5604,7 +5616,39 @@
           <a:p>
             <a:r>
               <a:rPr lang="en-US" sz="1800" dirty="0"/>
-              <a:t>Digital Posters at the 2025 Annual Meeting aim to offer interactive discussions to varying audiences with a consistent format for better browsing,  navigation, and offline viewing.  </a:t>
+              <a:t>Digital Posters at the </a:t>
+            </a:r>
+            <a:r>
+              <a:rPr lang="en-US" sz="1800" dirty="0" smtClean="0"/>
+              <a:t>2025 Annual Meeting aim </a:t>
+            </a:r>
+            <a:r>
+              <a:rPr lang="en-US" sz="1800" dirty="0"/>
+              <a:t>to offer interactive discussions to varying </a:t>
+            </a:r>
+            <a:r>
+              <a:rPr lang="en-US" sz="1800" dirty="0" smtClean="0"/>
+              <a:t>audiences with a </a:t>
+            </a:r>
+            <a:r>
+              <a:rPr lang="en-US" sz="1800" dirty="0"/>
+              <a:t>consistent format for better browsing,  </a:t>
+            </a:r>
+            <a:r>
+              <a:rPr lang="en-US" sz="1800" dirty="0" smtClean="0"/>
+              <a:t>navigation, </a:t>
+            </a:r>
+            <a:r>
+              <a:rPr lang="en-US" sz="1800" dirty="0"/>
+              <a:t>and </a:t>
+            </a:r>
+            <a:r>
+              <a:rPr lang="en-US" sz="1800" dirty="0" smtClean="0"/>
+              <a:t>offline </a:t>
+            </a:r>
+            <a:r>
+              <a:rPr lang="en-US" sz="1800" dirty="0"/>
+              <a:t>viewing.  </a:t>
             </a:r>
           </a:p>
           <a:p>
@@ -5613,7 +5657,39 @@
           <a:p>
             <a:r>
               <a:rPr lang="en-US" sz="1800" dirty="0"/>
-              <a:t>This is a simple slide template – you should modify the styles, fonts, and layout to make it unique to your presentation. Add images, videos, and animation as you wish!</a:t>
+              <a:t>This is a </a:t>
+            </a:r>
+            <a:r>
+              <a:rPr lang="en-US" sz="1800" dirty="0" smtClean="0"/>
+              <a:t>simple slide </a:t>
+            </a:r>
+            <a:r>
+              <a:rPr lang="en-US" sz="1800" dirty="0"/>
+              <a:t>template – you should </a:t>
+            </a:r>
+            <a:r>
+              <a:rPr lang="en-US" sz="1800" dirty="0" smtClean="0"/>
+              <a:t>modify </a:t>
+            </a:r>
+            <a:r>
+              <a:rPr lang="en-US" sz="1800" dirty="0"/>
+              <a:t>the styles, fonts, and </a:t>
+            </a:r>
+            <a:r>
+              <a:rPr lang="en-US" sz="1800" dirty="0" smtClean="0"/>
+              <a:t>layout to make it unique to your presentation. Add </a:t>
+            </a:r>
+            <a:r>
+              <a:rPr lang="en-US" sz="1800" dirty="0"/>
+              <a:t>images, </a:t>
+            </a:r>
+            <a:r>
+              <a:rPr lang="en-US" sz="1800" dirty="0" smtClean="0"/>
+              <a:t>videos, </a:t>
+            </a:r>
+            <a:r>
+              <a:rPr lang="en-US" sz="1800" dirty="0"/>
+              <a:t>and animation as you wish!</a:t>
             </a:r>
           </a:p>
         </p:txBody>
@@ -5643,7 +5719,7 @@
           </a:ln>
           <a:extLst>
             <a:ext uri="{C572A759-6A51-4108-AA02-DFA0A04FC94B}">
-              <ma14:wrappingTextBoxFlag xmlns:ma14="http://schemas.microsoft.com/office/mac/drawingml/2011/main" xmlns:a14="http://schemas.microsoft.com/office/drawing/2010/main" xmlns:m="http://schemas.openxmlformats.org/officeDocument/2006/math" xmlns="" val="1"/>
+              <ma14:wrappingTextBoxFlag xmlns="" xmlns:m="http://schemas.openxmlformats.org/officeDocument/2006/math" xmlns:a14="http://schemas.microsoft.com/office/drawing/2010/main" xmlns:ma14="http://schemas.microsoft.com/office/mac/drawingml/2011/main" val="1"/>
             </a:ext>
           </a:extLst>
         </p:spPr>
@@ -5659,21 +5735,49 @@
           <a:p>
             <a:pPr algn="ctr"/>
             <a:r>
+              <a:rPr lang="en-US" sz="2000" dirty="0" smtClean="0">
+                <a:hlinkClick r:id="rId4"/>
+              </a:rPr>
+              <a:t>Guidelines for </a:t>
+            </a:r>
+            <a:r>
               <a:rPr lang="en-US" sz="2000" dirty="0">
                 <a:hlinkClick r:id="rId4"/>
               </a:rPr>
-              <a:t>Guidelines for poster submissions are available here</a:t>
+              <a:t>poster submissions </a:t>
+            </a:r>
+            <a:r>
+              <a:rPr lang="en-US" sz="2000" dirty="0" smtClean="0">
+                <a:hlinkClick r:id="rId4"/>
+              </a:rPr>
+              <a:t>are </a:t>
+            </a:r>
+            <a:r>
+              <a:rPr lang="en-US" sz="2000" dirty="0">
+                <a:hlinkClick r:id="rId4"/>
+              </a:rPr>
+              <a:t>available </a:t>
+            </a:r>
+            <a:r>
+              <a:rPr lang="en-US" sz="2000" dirty="0" smtClean="0">
+                <a:hlinkClick r:id="rId4"/>
+              </a:rPr>
+              <a:t>here</a:t>
+            </a:r>
+            <a:r>
+              <a:rPr lang="en-US" sz="2000" dirty="0" smtClean="0"/>
+              <a:t>.</a:t>
+            </a:r>
+            <a:br>
+              <a:rPr lang="en-US" sz="2000" dirty="0" smtClean="0"/>
+            </a:br>
+            <a:r>
+              <a:rPr lang="en-US" sz="2000" dirty="0" smtClean="0"/>
+              <a:t>Speaker </a:t>
             </a:r>
             <a:r>
               <a:rPr lang="en-US" sz="2000" dirty="0"/>
-              <a:t>.</a:t>
-            </a:r>
-            <a:br>
-              <a:rPr lang="en-US" sz="2000" dirty="0"/>
-            </a:br>
-            <a:r>
-              <a:rPr lang="en-US" sz="2000" dirty="0"/>
-              <a:t>Speaker Notes on these slides have some comments to help you.</a:t>
+              <a:t>Notes on these slides have some comments to help you.</a:t>
             </a:r>
           </a:p>
         </p:txBody>
@@ -6683,7 +6787,7 @@
               <a:t> Digital Poster </a:t>
             </a:r>
             <a:r>
-              <a:rPr lang="en-US" sz="4000" dirty="0"/>
+              <a:rPr lang="en-US" sz="4000" dirty="0" smtClean="0"/>
               <a:t>at the Meeting</a:t>
             </a:r>
             <a:endParaRPr sz="4000" dirty="0"/>
@@ -6709,7 +6813,7 @@
           </a:ln>
           <a:extLst>
             <a:ext uri="{C572A759-6A51-4108-AA02-DFA0A04FC94B}">
-              <ma14:wrappingTextBoxFlag xmlns:ma14="http://schemas.microsoft.com/office/mac/drawingml/2011/main" xmlns:a14="http://schemas.microsoft.com/office/drawing/2010/main" xmlns:m="http://schemas.openxmlformats.org/officeDocument/2006/math" xmlns="" val="1"/>
+              <ma14:wrappingTextBoxFlag xmlns="" xmlns:m="http://schemas.openxmlformats.org/officeDocument/2006/math" xmlns:a14="http://schemas.microsoft.com/office/drawing/2010/main" xmlns:ma14="http://schemas.microsoft.com/office/mac/drawingml/2011/main" val="1"/>
             </a:ext>
           </a:extLst>
         </p:spPr>
@@ -6765,7 +6869,7 @@
           </a:ln>
           <a:extLst>
             <a:ext uri="{C572A759-6A51-4108-AA02-DFA0A04FC94B}">
-              <ma14:wrappingTextBoxFlag xmlns:ma14="http://schemas.microsoft.com/office/mac/drawingml/2011/main" xmlns:a14="http://schemas.microsoft.com/office/drawing/2010/main" xmlns:m="http://schemas.openxmlformats.org/officeDocument/2006/math" xmlns="" val="1"/>
+              <ma14:wrappingTextBoxFlag xmlns="" xmlns:m="http://schemas.openxmlformats.org/officeDocument/2006/math" xmlns:a14="http://schemas.microsoft.com/office/drawing/2010/main" xmlns:ma14="http://schemas.microsoft.com/office/mac/drawingml/2011/main" val="1"/>
             </a:ext>
           </a:extLst>
         </p:spPr>
@@ -6780,8 +6884,12 @@
           </a:lstStyle>
           <a:p>
             <a:r>
+              <a:rPr lang="en-US" dirty="0" smtClean="0"/>
+              <a:t>First Author </a:t>
+            </a:r>
+            <a:r>
               <a:rPr lang="en-US" dirty="0"/>
-              <a:t>First Author Name</a:t>
+              <a:t>Name</a:t>
             </a:r>
             <a:r>
               <a:rPr lang="en-US" baseline="30000" dirty="0"/>
@@ -6789,18 +6897,26 @@
             </a:r>
             <a:r>
               <a:rPr lang="en-US" dirty="0"/>
-              <a:t>, Second Author</a:t>
-            </a:r>
-            <a:r>
-              <a:rPr lang="en-US" baseline="30000" dirty="0"/>
+              <a:t>, </a:t>
+            </a:r>
+            <a:r>
+              <a:rPr lang="en-US" dirty="0" smtClean="0"/>
+              <a:t>Second Author</a:t>
+            </a:r>
+            <a:r>
+              <a:rPr lang="en-US" baseline="30000" dirty="0" smtClean="0"/>
               <a:t>2</a:t>
             </a:r>
             <a:r>
               <a:rPr lang="en-US" dirty="0"/>
-              <a:t>, Author N. Three</a:t>
-            </a:r>
-            <a:r>
-              <a:rPr lang="en-US" baseline="30000" dirty="0"/>
+              <a:t>, Author </a:t>
+            </a:r>
+            <a:r>
+              <a:rPr lang="en-US" dirty="0" smtClean="0"/>
+              <a:t>N. Three</a:t>
+            </a:r>
+            <a:r>
+              <a:rPr lang="en-US" baseline="30000" dirty="0" smtClean="0"/>
               <a:t>1,2</a:t>
             </a:r>
             <a:endParaRPr baseline="30000" dirty="0"/>
@@ -7234,9 +7350,14 @@
           <a:p>
             <a:pPr algn="ctr"/>
             <a:r>
+              <a:rPr lang="en-US" i="1" dirty="0" smtClean="0"/>
+              <a:t>Get this year’s declaration slides at https</a:t>
+            </a:r>
+            <a:r>
               <a:rPr lang="en-US" i="1" dirty="0"/>
-              <a:t>Get this year’s declaration slides at https://www.ismrm.org/25m/guidelines/</a:t>
-            </a:r>
+              <a:t>://www.ismrm.org/25m/guidelines/</a:t>
+            </a:r>
+            <a:endParaRPr lang="en-US" i="1" dirty="0"/>
           </a:p>
         </p:txBody>
       </p:sp>

</xml_diff>

<commit_message>
some ppt updates ismrm
</commit_message>
<xml_diff>
--- a/ismrm_final/digital_poster/Digital_Poster_Template_2025.pptx
+++ b/ismrm_final/digital_poster/Digital_Poster_Template_2025.pptx
@@ -5,23 +5,24 @@
     <p:sldMasterId id="2147483648" r:id="rId1"/>
   </p:sldMasterIdLst>
   <p:notesMasterIdLst>
-    <p:notesMasterId r:id="rId16"/>
+    <p:notesMasterId r:id="rId17"/>
   </p:notesMasterIdLst>
   <p:sldIdLst>
     <p:sldId id="256" r:id="rId2"/>
-    <p:sldId id="275" r:id="rId3"/>
-    <p:sldId id="257" r:id="rId4"/>
-    <p:sldId id="261" r:id="rId5"/>
-    <p:sldId id="259" r:id="rId6"/>
-    <p:sldId id="266" r:id="rId7"/>
-    <p:sldId id="270" r:id="rId8"/>
-    <p:sldId id="267" r:id="rId9"/>
-    <p:sldId id="271" r:id="rId10"/>
-    <p:sldId id="272" r:id="rId11"/>
-    <p:sldId id="268" r:id="rId12"/>
-    <p:sldId id="273" r:id="rId13"/>
-    <p:sldId id="269" r:id="rId14"/>
-    <p:sldId id="274" r:id="rId15"/>
+    <p:sldId id="276" r:id="rId3"/>
+    <p:sldId id="275" r:id="rId4"/>
+    <p:sldId id="257" r:id="rId5"/>
+    <p:sldId id="261" r:id="rId6"/>
+    <p:sldId id="259" r:id="rId7"/>
+    <p:sldId id="266" r:id="rId8"/>
+    <p:sldId id="270" r:id="rId9"/>
+    <p:sldId id="267" r:id="rId10"/>
+    <p:sldId id="271" r:id="rId11"/>
+    <p:sldId id="272" r:id="rId12"/>
+    <p:sldId id="268" r:id="rId13"/>
+    <p:sldId id="273" r:id="rId14"/>
+    <p:sldId id="269" r:id="rId15"/>
+    <p:sldId id="274" r:id="rId16"/>
   </p:sldIdLst>
   <p:sldSz cx="9144000" cy="5143500" type="screen16x9"/>
   <p:notesSz cx="6858000" cy="9144000"/>
@@ -648,7 +649,7 @@
     </p:spTree>
     <p:extLst>
       <p:ext uri="{BB962C8B-B14F-4D97-AF65-F5344CB8AC3E}">
-        <p14:creationId xmlns:p14="http://schemas.microsoft.com/office/powerpoint/2010/main" val="395442741"/>
+        <p14:creationId xmlns:p14="http://schemas.microsoft.com/office/powerpoint/2010/main" val="1399575793"/>
       </p:ext>
     </p:extLst>
   </p:cSld>
@@ -709,30 +710,21 @@
           <a:p>
             <a:r>
               <a:rPr lang="en-US" dirty="0"/>
-              <a:t>This is a section heading slide, which you will link to from your summary text heading.  </a:t>
+              <a:t>This is a sample slide that is NOT a section heading. </a:t>
             </a:r>
           </a:p>
           <a:p>
             <a:r>
               <a:rPr lang="en-US" dirty="0"/>
-              <a:t>Put some information on this slide, without much animation, so you can quickly show information from the link, even when the video is paused.</a:t>
-            </a:r>
-          </a:p>
-          <a:p>
-            <a:r>
-              <a:rPr lang="en-US" dirty="0"/>
-              <a:t>You may want to use a different tile style for section heading slides compared to other slides.</a:t>
-            </a:r>
-          </a:p>
-          <a:p>
-            <a:endParaRPr lang="en-US" dirty="0"/>
+              <a:t>You may put as many slides between headings as you would like, with any titles.</a:t>
+            </a:r>
           </a:p>
         </p:txBody>
       </p:sp>
     </p:spTree>
     <p:extLst>
       <p:ext uri="{BB962C8B-B14F-4D97-AF65-F5344CB8AC3E}">
-        <p14:creationId xmlns:p14="http://schemas.microsoft.com/office/powerpoint/2010/main" val="685382352"/>
+        <p14:creationId xmlns:p14="http://schemas.microsoft.com/office/powerpoint/2010/main" val="395442741"/>
       </p:ext>
     </p:extLst>
   </p:cSld>
@@ -793,21 +785,30 @@
           <a:p>
             <a:r>
               <a:rPr lang="en-US" dirty="0"/>
-              <a:t>This is a sample slide that is NOT a section heading. </a:t>
+              <a:t>This is a section heading slide, which you will link to from your summary text heading.  </a:t>
             </a:r>
           </a:p>
           <a:p>
             <a:r>
               <a:rPr lang="en-US" dirty="0"/>
-              <a:t>You may put as many slides between headings as you would like, with any titles.</a:t>
-            </a:r>
+              <a:t>Put some information on this slide, without much animation, so you can quickly show information from the link, even when the video is paused.</a:t>
+            </a:r>
+          </a:p>
+          <a:p>
+            <a:r>
+              <a:rPr lang="en-US" dirty="0"/>
+              <a:t>You may want to use a different tile style for section heading slides compared to other slides.</a:t>
+            </a:r>
+          </a:p>
+          <a:p>
+            <a:endParaRPr lang="en-US" dirty="0"/>
           </a:p>
         </p:txBody>
       </p:sp>
     </p:spTree>
     <p:extLst>
       <p:ext uri="{BB962C8B-B14F-4D97-AF65-F5344CB8AC3E}">
-        <p14:creationId xmlns:p14="http://schemas.microsoft.com/office/powerpoint/2010/main" val="2907459787"/>
+        <p14:creationId xmlns:p14="http://schemas.microsoft.com/office/powerpoint/2010/main" val="685382352"/>
       </p:ext>
     </p:extLst>
   </p:cSld>
@@ -868,6 +869,81 @@
           <a:p>
             <a:r>
               <a:rPr lang="en-US" dirty="0"/>
+              <a:t>This is a sample slide that is NOT a section heading. </a:t>
+            </a:r>
+          </a:p>
+          <a:p>
+            <a:r>
+              <a:rPr lang="en-US" dirty="0"/>
+              <a:t>You may put as many slides between headings as you would like, with any titles.</a:t>
+            </a:r>
+          </a:p>
+        </p:txBody>
+      </p:sp>
+    </p:spTree>
+    <p:extLst>
+      <p:ext uri="{BB962C8B-B14F-4D97-AF65-F5344CB8AC3E}">
+        <p14:creationId xmlns:p14="http://schemas.microsoft.com/office/powerpoint/2010/main" val="2907459787"/>
+      </p:ext>
+    </p:extLst>
+  </p:cSld>
+  <p:clrMapOvr>
+    <a:masterClrMapping/>
+  </p:clrMapOvr>
+</p:notes>
+</file>
+
+<file path=ppt/notesSlides/notesSlide14.xml><?xml version="1.0" encoding="utf-8"?>
+<p:notes xmlns:a="http://schemas.openxmlformats.org/drawingml/2006/main" xmlns:r="http://schemas.openxmlformats.org/officeDocument/2006/relationships" xmlns:p="http://schemas.openxmlformats.org/presentationml/2006/main">
+  <p:cSld>
+    <p:spTree>
+      <p:nvGrpSpPr>
+        <p:cNvPr id="1" name=""/>
+        <p:cNvGrpSpPr/>
+        <p:nvPr/>
+      </p:nvGrpSpPr>
+      <p:grpSpPr>
+        <a:xfrm>
+          <a:off x="0" y="0"/>
+          <a:ext cx="0" cy="0"/>
+          <a:chOff x="0" y="0"/>
+          <a:chExt cx="0" cy="0"/>
+        </a:xfrm>
+      </p:grpSpPr>
+      <p:sp>
+        <p:nvSpPr>
+          <p:cNvPr id="2" name="Slide Image Placeholder 1"/>
+          <p:cNvSpPr>
+            <a:spLocks noGrp="1" noRot="1" noChangeAspect="1"/>
+          </p:cNvSpPr>
+          <p:nvPr>
+            <p:ph type="sldImg"/>
+          </p:nvPr>
+        </p:nvSpPr>
+        <p:spPr>
+          <a:xfrm>
+            <a:off x="381000" y="685800"/>
+            <a:ext cx="6096000" cy="3429000"/>
+          </a:xfrm>
+        </p:spPr>
+      </p:sp>
+      <p:sp>
+        <p:nvSpPr>
+          <p:cNvPr id="3" name="Notes Placeholder 2"/>
+          <p:cNvSpPr>
+            <a:spLocks noGrp="1"/>
+          </p:cNvSpPr>
+          <p:nvPr>
+            <p:ph type="body" idx="1"/>
+          </p:nvPr>
+        </p:nvSpPr>
+        <p:spPr/>
+        <p:txBody>
+          <a:bodyPr/>
+          <a:lstStyle/>
+          <a:p>
+            <a:r>
+              <a:rPr lang="en-US" dirty="0"/>
               <a:t>This is a section heading slide, which you will link to from your summary text heading.  </a:t>
             </a:r>
           </a:p>
@@ -901,7 +977,7 @@
 </p:notes>
 </file>
 
-<file path=ppt/notesSlides/notesSlide14.xml><?xml version="1.0" encoding="utf-8"?>
+<file path=ppt/notesSlides/notesSlide15.xml><?xml version="1.0" encoding="utf-8"?>
 <p:notes xmlns:a="http://schemas.openxmlformats.org/drawingml/2006/main" xmlns:r="http://schemas.openxmlformats.org/officeDocument/2006/relationships" xmlns:p="http://schemas.openxmlformats.org/presentationml/2006/main">
   <p:cSld>
     <p:spTree>
@@ -1034,47 +1110,14 @@
           <a:bodyPr/>
           <a:lstStyle/>
           <a:p>
-            <a:r>
-              <a:rPr lang="en-US" dirty="0"/>
-              <a:t>You do NOT need a title slide, as your video will appear with the title.  (You could delete this slide) </a:t>
-            </a:r>
-          </a:p>
-          <a:p>
-            <a:r>
-              <a:rPr lang="en-US" dirty="0"/>
-              <a:t>But IF you really want to have one so you can use the same video elsewhere, you should put that information on the second slide.</a:t>
-            </a:r>
-          </a:p>
-          <a:p>
-            <a:r>
-              <a:rPr lang="en-US" dirty="0"/>
-              <a:t>For recording, you could read the title, or quickly past the cover slide and this slide before you start narration.</a:t>
-            </a:r>
-          </a:p>
-          <a:p>
-            <a:endParaRPr lang="en-US" dirty="0"/>
-          </a:p>
-          <a:p>
-            <a:r>
-              <a:rPr lang="en-US" dirty="0"/>
-              <a:t>Suggestion – when you record the video, quickly move past this slide so it serves only as a title.</a:t>
-            </a:r>
-          </a:p>
-          <a:p>
-            <a:r>
-              <a:rPr lang="en-US" dirty="0"/>
-              <a:t>(You will probably have other slides to describe the Purpose / Introduction / Motivation / Goal, so use those to introduce your work)</a:t>
-            </a:r>
-          </a:p>
-          <a:p>
-            <a:endParaRPr lang="en-US" dirty="0"/>
+            <a:endParaRPr lang="en-DE" dirty="0"/>
           </a:p>
         </p:txBody>
       </p:sp>
     </p:spTree>
     <p:extLst>
       <p:ext uri="{BB962C8B-B14F-4D97-AF65-F5344CB8AC3E}">
-        <p14:creationId xmlns:p14="http://schemas.microsoft.com/office/powerpoint/2010/main" val="788154522"/>
+        <p14:creationId xmlns:p14="http://schemas.microsoft.com/office/powerpoint/2010/main" val="3542513184"/>
       </p:ext>
     </p:extLst>
   </p:cSld>
@@ -1135,40 +1178,37 @@
           <a:p>
             <a:r>
               <a:rPr lang="en-US" dirty="0"/>
-              <a:t>A disclosure slide is optional but </a:t>
-            </a:r>
-            <a:r>
-              <a:rPr lang="en-US" dirty="0" smtClean="0"/>
-              <a:t>encouraged </a:t>
-            </a:r>
+              <a:t>You do NOT need a title slide, as your video will appear with the title.  (You could delete this slide) </a:t>
+            </a:r>
+          </a:p>
+          <a:p>
             <a:r>
               <a:rPr lang="en-US" dirty="0"/>
-              <a:t>if you do have potential conflicts to disclose</a:t>
-            </a:r>
-            <a:r>
-              <a:rPr lang="en-US" dirty="0" smtClean="0"/>
-              <a:t>.</a:t>
-            </a:r>
-          </a:p>
-          <a:p>
-            <a:endParaRPr lang="en-US" dirty="0" smtClean="0"/>
-          </a:p>
-          <a:p>
-            <a:r>
-              <a:rPr lang="en-US" dirty="0" smtClean="0"/>
-              <a:t>A variety of PowerPoint templates for this slide are available</a:t>
-            </a:r>
-            <a:r>
-              <a:rPr lang="en-US" baseline="0" dirty="0" smtClean="0"/>
-              <a:t> on the Guidelines page under the Declaration Slides tab:</a:t>
-            </a:r>
-            <a:br>
-              <a:rPr lang="en-US" baseline="0" dirty="0" smtClean="0"/>
-            </a:br>
-            <a:r>
-              <a:rPr lang="en-US" baseline="0" dirty="0" smtClean="0"/>
-              <a:t>https://www.ismrm.org/25m/guidelines/</a:t>
-            </a:r>
+              <a:t>But IF you really want to have one so you can use the same video elsewhere, you should put that information on the second slide.</a:t>
+            </a:r>
+          </a:p>
+          <a:p>
+            <a:r>
+              <a:rPr lang="en-US" dirty="0"/>
+              <a:t>For recording, you could read the title, or quickly past the cover slide and this slide before you start narration.</a:t>
+            </a:r>
+          </a:p>
+          <a:p>
+            <a:endParaRPr lang="en-US" dirty="0"/>
+          </a:p>
+          <a:p>
+            <a:r>
+              <a:rPr lang="en-US" dirty="0"/>
+              <a:t>Suggestion – when you record the video, quickly move past this slide so it serves only as a title.</a:t>
+            </a:r>
+          </a:p>
+          <a:p>
+            <a:r>
+              <a:rPr lang="en-US" dirty="0"/>
+              <a:t>(You will probably have other slides to describe the Purpose / Introduction / Motivation / Goal, so use those to introduce your work)</a:t>
+            </a:r>
+          </a:p>
+          <a:p>
             <a:endParaRPr lang="en-US" dirty="0"/>
           </a:p>
         </p:txBody>
@@ -1176,7 +1216,7 @@
     </p:spTree>
     <p:extLst>
       <p:ext uri="{BB962C8B-B14F-4D97-AF65-F5344CB8AC3E}">
-        <p14:creationId xmlns:p14="http://schemas.microsoft.com/office/powerpoint/2010/main" val="198474591"/>
+        <p14:creationId xmlns:p14="http://schemas.microsoft.com/office/powerpoint/2010/main" val="788154522"/>
       </p:ext>
     </p:extLst>
   </p:cSld>
@@ -1237,22 +1277,28 @@
           <a:p>
             <a:r>
               <a:rPr lang="en-US" dirty="0"/>
-              <a:t>This is a section heading slide, which you will link to from your summary text heading.  </a:t>
-            </a:r>
+              <a:t>A disclosure slide is optional but encouraged if you do have potential conflicts to disclose.</a:t>
+            </a:r>
+          </a:p>
+          <a:p>
+            <a:endParaRPr lang="en-US" dirty="0"/>
           </a:p>
           <a:p>
             <a:r>
               <a:rPr lang="en-US" dirty="0"/>
-              <a:t>Put some information on this slide, without much animation, so you can quickly show information from the link, even when the video is paused.</a:t>
-            </a:r>
-          </a:p>
-          <a:p>
-            <a:r>
-              <a:rPr lang="en-US" dirty="0"/>
-              <a:t>You may want to use a different tile style for section heading slides compared to other slides.</a:t>
-            </a:r>
-          </a:p>
-          <a:p>
+              <a:t>A variety of PowerPoint templates for this slide are available</a:t>
+            </a:r>
+            <a:r>
+              <a:rPr lang="en-US" baseline="0" dirty="0"/>
+              <a:t> on the Guidelines page under the Declaration Slides tab:</a:t>
+            </a:r>
+            <a:br>
+              <a:rPr lang="en-US" baseline="0" dirty="0"/>
+            </a:br>
+            <a:r>
+              <a:rPr lang="en-US" baseline="0" dirty="0"/>
+              <a:t>https://www.ismrm.org/25m/guidelines/</a:t>
+            </a:r>
             <a:endParaRPr lang="en-US" dirty="0"/>
           </a:p>
         </p:txBody>
@@ -1260,7 +1306,7 @@
     </p:spTree>
     <p:extLst>
       <p:ext uri="{BB962C8B-B14F-4D97-AF65-F5344CB8AC3E}">
-        <p14:creationId xmlns:p14="http://schemas.microsoft.com/office/powerpoint/2010/main" val="336565057"/>
+        <p14:creationId xmlns:p14="http://schemas.microsoft.com/office/powerpoint/2010/main" val="198474591"/>
       </p:ext>
     </p:extLst>
   </p:cSld>
@@ -1321,21 +1367,30 @@
           <a:p>
             <a:r>
               <a:rPr lang="en-US" dirty="0"/>
-              <a:t>You can put some slides before the first section heading.  </a:t>
+              <a:t>This is a section heading slide, which you will link to from your summary text heading.  </a:t>
             </a:r>
           </a:p>
           <a:p>
             <a:r>
               <a:rPr lang="en-US" dirty="0"/>
-              <a:t>Note that the poster title will link to the start of the video, so you can jump to the first slides.</a:t>
-            </a:r>
+              <a:t>Put some information on this slide, without much animation, so you can quickly show information from the link, even when the video is paused.</a:t>
+            </a:r>
+          </a:p>
+          <a:p>
+            <a:r>
+              <a:rPr lang="en-US" dirty="0"/>
+              <a:t>You may want to use a different tile style for section heading slides compared to other slides.</a:t>
+            </a:r>
+          </a:p>
+          <a:p>
+            <a:endParaRPr lang="en-US" dirty="0"/>
           </a:p>
         </p:txBody>
       </p:sp>
     </p:spTree>
     <p:extLst>
       <p:ext uri="{BB962C8B-B14F-4D97-AF65-F5344CB8AC3E}">
-        <p14:creationId xmlns:p14="http://schemas.microsoft.com/office/powerpoint/2010/main" val="2557442499"/>
+        <p14:creationId xmlns:p14="http://schemas.microsoft.com/office/powerpoint/2010/main" val="336565057"/>
       </p:ext>
     </p:extLst>
   </p:cSld>
@@ -1396,47 +1451,21 @@
           <a:p>
             <a:r>
               <a:rPr lang="en-US" dirty="0"/>
-              <a:t>This is a section heading slide, which you will link to from your summary text heading.  </a:t>
+              <a:t>You can put some slides before the first section heading.  </a:t>
             </a:r>
           </a:p>
           <a:p>
             <a:r>
               <a:rPr lang="en-US" dirty="0"/>
-              <a:t>Put some information on this slide, without much animation, so you can quickly show information from the link, even when the video is paused.</a:t>
-            </a:r>
-          </a:p>
-          <a:p>
-            <a:r>
-              <a:rPr lang="en-US" dirty="0"/>
-              <a:t>You may want to use a different tile style for section heading slides compared to other slides.</a:t>
-            </a:r>
-          </a:p>
-          <a:p>
-            <a:endParaRPr lang="en-US" dirty="0"/>
-          </a:p>
-          <a:p>
-            <a:r>
-              <a:rPr lang="en-US" dirty="0"/>
-              <a:t>You do not have to use the </a:t>
-            </a:r>
-            <a:r>
-              <a:rPr lang="en-US" dirty="0" err="1"/>
-              <a:t>Synposis</a:t>
-            </a:r>
-            <a:r>
-              <a:rPr lang="en-US" dirty="0"/>
-              <a:t> headings – and you can have up to 8 sections that are linked.</a:t>
-            </a:r>
-          </a:p>
-          <a:p>
-            <a:endParaRPr lang="en-US" dirty="0"/>
+              <a:t>Note that the poster title will link to the start of the video, so you can jump to the first slides.</a:t>
+            </a:r>
           </a:p>
         </p:txBody>
       </p:sp>
     </p:spTree>
     <p:extLst>
       <p:ext uri="{BB962C8B-B14F-4D97-AF65-F5344CB8AC3E}">
-        <p14:creationId xmlns:p14="http://schemas.microsoft.com/office/powerpoint/2010/main" val="1973998714"/>
+        <p14:creationId xmlns:p14="http://schemas.microsoft.com/office/powerpoint/2010/main" val="2557442499"/>
       </p:ext>
     </p:extLst>
   </p:cSld>
@@ -1497,21 +1526,47 @@
           <a:p>
             <a:r>
               <a:rPr lang="en-US" dirty="0"/>
-              <a:t>This is a sample slide that is NOT a section heading. </a:t>
+              <a:t>This is a section heading slide, which you will link to from your summary text heading.  </a:t>
             </a:r>
           </a:p>
           <a:p>
             <a:r>
               <a:rPr lang="en-US" dirty="0"/>
-              <a:t>You may put as many slides between headings as you would like, with any titles.</a:t>
-            </a:r>
+              <a:t>Put some information on this slide, without much animation, so you can quickly show information from the link, even when the video is paused.</a:t>
+            </a:r>
+          </a:p>
+          <a:p>
+            <a:r>
+              <a:rPr lang="en-US" dirty="0"/>
+              <a:t>You may want to use a different tile style for section heading slides compared to other slides.</a:t>
+            </a:r>
+          </a:p>
+          <a:p>
+            <a:endParaRPr lang="en-US" dirty="0"/>
+          </a:p>
+          <a:p>
+            <a:r>
+              <a:rPr lang="en-US" dirty="0"/>
+              <a:t>You do not have to use the </a:t>
+            </a:r>
+            <a:r>
+              <a:rPr lang="en-US" dirty="0" err="1"/>
+              <a:t>Synposis</a:t>
+            </a:r>
+            <a:r>
+              <a:rPr lang="en-US" dirty="0"/>
+              <a:t> headings – and you can have up to 8 sections that are linked.</a:t>
+            </a:r>
+          </a:p>
+          <a:p>
+            <a:endParaRPr lang="en-US" dirty="0"/>
           </a:p>
         </p:txBody>
       </p:sp>
     </p:spTree>
     <p:extLst>
       <p:ext uri="{BB962C8B-B14F-4D97-AF65-F5344CB8AC3E}">
-        <p14:creationId xmlns:p14="http://schemas.microsoft.com/office/powerpoint/2010/main" val="1009393193"/>
+        <p14:creationId xmlns:p14="http://schemas.microsoft.com/office/powerpoint/2010/main" val="1973998714"/>
       </p:ext>
     </p:extLst>
   </p:cSld>
@@ -1572,19 +1627,13 @@
           <a:p>
             <a:r>
               <a:rPr lang="en-US" dirty="0"/>
-              <a:t>This is a section heading slide, which you will link to from your summary text heading.  </a:t>
+              <a:t>This is a sample slide that is NOT a section heading. </a:t>
             </a:r>
           </a:p>
           <a:p>
             <a:r>
               <a:rPr lang="en-US" dirty="0"/>
-              <a:t>Put some information on this slide, without much animation, so you can quickly show information from the link, even when the video is paused.</a:t>
-            </a:r>
-          </a:p>
-          <a:p>
-            <a:r>
-              <a:rPr lang="en-US" dirty="0"/>
-              <a:t>You may want to use a different tile style for section heading slides compared to other slides.</a:t>
+              <a:t>You may put as many slides between headings as you would like, with any titles.</a:t>
             </a:r>
           </a:p>
         </p:txBody>
@@ -1592,7 +1641,7 @@
     </p:spTree>
     <p:extLst>
       <p:ext uri="{BB962C8B-B14F-4D97-AF65-F5344CB8AC3E}">
-        <p14:creationId xmlns:p14="http://schemas.microsoft.com/office/powerpoint/2010/main" val="3575641627"/>
+        <p14:creationId xmlns:p14="http://schemas.microsoft.com/office/powerpoint/2010/main" val="1009393193"/>
       </p:ext>
     </p:extLst>
   </p:cSld>
@@ -1653,13 +1702,19 @@
           <a:p>
             <a:r>
               <a:rPr lang="en-US" dirty="0"/>
-              <a:t>This is a sample slide that is NOT a section heading. </a:t>
+              <a:t>This is a section heading slide, which you will link to from your summary text heading.  </a:t>
             </a:r>
           </a:p>
           <a:p>
             <a:r>
               <a:rPr lang="en-US" dirty="0"/>
-              <a:t>You may put as many slides between headings as you would like, with any titles.</a:t>
+              <a:t>Put some information on this slide, without much animation, so you can quickly show information from the link, even when the video is paused.</a:t>
+            </a:r>
+          </a:p>
+          <a:p>
+            <a:r>
+              <a:rPr lang="en-US" dirty="0"/>
+              <a:t>You may want to use a different tile style for section heading slides compared to other slides.</a:t>
             </a:r>
           </a:p>
         </p:txBody>
@@ -1667,7 +1722,7 @@
     </p:spTree>
     <p:extLst>
       <p:ext uri="{BB962C8B-B14F-4D97-AF65-F5344CB8AC3E}">
-        <p14:creationId xmlns:p14="http://schemas.microsoft.com/office/powerpoint/2010/main" val="1399575793"/>
+        <p14:creationId xmlns:p14="http://schemas.microsoft.com/office/powerpoint/2010/main" val="3575641627"/>
       </p:ext>
     </p:extLst>
   </p:cSld>
@@ -2871,7 +2926,7 @@
                 </a:solidFill>
               </a:rPr>
               <a:pPr/>
-              <a:t>3/13/2025</a:t>
+              <a:t>5/4/2025</a:t>
             </a:fld>
             <a:endParaRPr lang="en-US">
               <a:solidFill>
@@ -2948,6 +3003,1115 @@
     <p:extLst>
       <p:ext uri="{BB962C8B-B14F-4D97-AF65-F5344CB8AC3E}">
         <p14:creationId xmlns:p14="http://schemas.microsoft.com/office/powerpoint/2010/main" val="3367644421"/>
+      </p:ext>
+    </p:extLst>
+  </p:cSld>
+  <p:clrMapOvr>
+    <a:masterClrMapping/>
+  </p:clrMapOvr>
+</p:sldLayout>
+</file>
+
+<file path=ppt/slideLayouts/slideLayout17.xml><?xml version="1.0" encoding="utf-8"?>
+<p:sldLayout xmlns:a="http://schemas.openxmlformats.org/drawingml/2006/main" xmlns:r="http://schemas.openxmlformats.org/officeDocument/2006/relationships" xmlns:p="http://schemas.openxmlformats.org/presentationml/2006/main" userDrawn="1">
+  <p:cSld name="Titelfolie">
+    <p:spTree>
+      <p:nvGrpSpPr>
+        <p:cNvPr id="1" name=""/>
+        <p:cNvGrpSpPr/>
+        <p:nvPr/>
+      </p:nvGrpSpPr>
+      <p:grpSpPr>
+        <a:xfrm>
+          <a:off x="0" y="0"/>
+          <a:ext cx="0" cy="0"/>
+          <a:chOff x="0" y="0"/>
+          <a:chExt cx="0" cy="0"/>
+        </a:xfrm>
+      </p:grpSpPr>
+      <p:sp>
+        <p:nvSpPr>
+          <p:cNvPr id="7" name="Rechteck 6"/>
+          <p:cNvSpPr/>
+          <p:nvPr userDrawn="1"/>
+        </p:nvSpPr>
+        <p:spPr>
+          <a:xfrm>
+            <a:off x="-7269" y="699542"/>
+            <a:ext cx="9144001" cy="3384376"/>
+          </a:xfrm>
+          <a:prstGeom prst="rect">
+            <a:avLst/>
+          </a:prstGeom>
+          <a:solidFill>
+            <a:srgbClr val="D9EDFF"/>
+          </a:solidFill>
+          <a:ln>
+            <a:noFill/>
+          </a:ln>
+        </p:spPr>
+        <p:style>
+          <a:lnRef idx="2">
+            <a:schemeClr val="accent1">
+              <a:shade val="50000"/>
+            </a:schemeClr>
+          </a:lnRef>
+          <a:fillRef idx="1">
+            <a:schemeClr val="accent1"/>
+          </a:fillRef>
+          <a:effectRef idx="0">
+            <a:schemeClr val="accent1"/>
+          </a:effectRef>
+          <a:fontRef idx="minor">
+            <a:schemeClr val="lt1"/>
+          </a:fontRef>
+        </p:style>
+        <p:txBody>
+          <a:bodyPr rtlCol="0" anchor="ctr"/>
+          <a:lstStyle/>
+          <a:p>
+            <a:pPr algn="ctr"/>
+            <a:endParaRPr lang="de-DE">
+              <a:latin typeface="Arial" panose="020B0604020202020204" pitchFamily="34" charset="0"/>
+              <a:cs typeface="Arial" panose="020B0604020202020204" pitchFamily="34" charset="0"/>
+            </a:endParaRPr>
+          </a:p>
+        </p:txBody>
+      </p:sp>
+      <p:grpSp>
+        <p:nvGrpSpPr>
+          <p:cNvPr id="8" name="Group 4"/>
+          <p:cNvGrpSpPr>
+            <a:grpSpLocks noChangeAspect="1"/>
+          </p:cNvGrpSpPr>
+          <p:nvPr userDrawn="1"/>
+        </p:nvGrpSpPr>
+        <p:grpSpPr bwMode="auto">
+          <a:xfrm>
+            <a:off x="-1645" y="-596602"/>
+            <a:ext cx="9156701" cy="3392488"/>
+            <a:chOff x="-8" y="921"/>
+            <a:chExt cx="5768" cy="2137"/>
+          </a:xfrm>
+        </p:grpSpPr>
+        <p:sp>
+          <p:nvSpPr>
+            <p:cNvPr id="9" name="AutoShape 3"/>
+            <p:cNvSpPr>
+              <a:spLocks noChangeAspect="1" noChangeArrowheads="1" noTextEdit="1"/>
+            </p:cNvSpPr>
+            <p:nvPr userDrawn="1"/>
+          </p:nvSpPr>
+          <p:spPr bwMode="auto">
+            <a:xfrm>
+              <a:off x="0" y="1262"/>
+              <a:ext cx="5760" cy="1796"/>
+            </a:xfrm>
+            <a:prstGeom prst="rect">
+              <a:avLst/>
+            </a:prstGeom>
+            <a:noFill/>
+            <a:ln>
+              <a:noFill/>
+            </a:ln>
+            <a:extLst>
+              <a:ext uri="{909E8E84-426E-40DD-AFC4-6F175D3DCCD1}">
+                <a14:hiddenFill xmlns:a14="http://schemas.microsoft.com/office/drawing/2010/main">
+                  <a:solidFill>
+                    <a:srgbClr val="FFFFFF"/>
+                  </a:solidFill>
+                </a14:hiddenFill>
+              </a:ext>
+              <a:ext uri="{91240B29-F687-4F45-9708-019B960494DF}">
+                <a14:hiddenLine xmlns:a14="http://schemas.microsoft.com/office/drawing/2010/main" w="9525">
+                  <a:solidFill>
+                    <a:srgbClr val="000000"/>
+                  </a:solidFill>
+                  <a:miter lim="800000"/>
+                  <a:headEnd/>
+                  <a:tailEnd/>
+                </a14:hiddenLine>
+              </a:ext>
+            </a:extLst>
+          </p:spPr>
+          <p:txBody>
+            <a:bodyPr vert="horz" wrap="square" lIns="91440" tIns="45720" rIns="91440" bIns="45720" numCol="1" anchor="t" anchorCtr="0" compatLnSpc="1">
+              <a:prstTxWarp prst="textNoShape">
+                <a:avLst/>
+              </a:prstTxWarp>
+            </a:bodyPr>
+            <a:lstStyle/>
+            <a:p>
+              <a:endParaRPr lang="de-DE">
+                <a:latin typeface="Arial" panose="020B0604020202020204" pitchFamily="34" charset="0"/>
+                <a:cs typeface="Arial" panose="020B0604020202020204" pitchFamily="34" charset="0"/>
+              </a:endParaRPr>
+            </a:p>
+          </p:txBody>
+        </p:sp>
+        <p:sp>
+          <p:nvSpPr>
+            <p:cNvPr id="10" name="Freeform 5"/>
+            <p:cNvSpPr>
+              <a:spLocks/>
+            </p:cNvSpPr>
+            <p:nvPr userDrawn="1"/>
+          </p:nvSpPr>
+          <p:spPr bwMode="auto">
+            <a:xfrm>
+              <a:off x="-8" y="921"/>
+              <a:ext cx="5768" cy="2137"/>
+            </a:xfrm>
+            <a:custGeom>
+              <a:avLst/>
+              <a:gdLst>
+                <a:gd name="T0" fmla="*/ 0 w 5760"/>
+                <a:gd name="T1" fmla="*/ 0 h 1796"/>
+                <a:gd name="T2" fmla="*/ 0 w 5760"/>
+                <a:gd name="T3" fmla="*/ 1796 h 1796"/>
+                <a:gd name="T4" fmla="*/ 2003 w 5760"/>
+                <a:gd name="T5" fmla="*/ 623 h 1796"/>
+                <a:gd name="T6" fmla="*/ 5760 w 5760"/>
+                <a:gd name="T7" fmla="*/ 623 h 1796"/>
+                <a:gd name="T8" fmla="*/ 5760 w 5760"/>
+                <a:gd name="T9" fmla="*/ 0 h 1796"/>
+                <a:gd name="T10" fmla="*/ 0 w 5760"/>
+                <a:gd name="T11" fmla="*/ 0 h 1796"/>
+                <a:gd name="connsiteX0" fmla="*/ 0 w 10000"/>
+                <a:gd name="connsiteY0" fmla="*/ 0 h 11897"/>
+                <a:gd name="connsiteX1" fmla="*/ 0 w 10000"/>
+                <a:gd name="connsiteY1" fmla="*/ 11897 h 11897"/>
+                <a:gd name="connsiteX2" fmla="*/ 3477 w 10000"/>
+                <a:gd name="connsiteY2" fmla="*/ 5366 h 11897"/>
+                <a:gd name="connsiteX3" fmla="*/ 10000 w 10000"/>
+                <a:gd name="connsiteY3" fmla="*/ 5366 h 11897"/>
+                <a:gd name="connsiteX4" fmla="*/ 10000 w 10000"/>
+                <a:gd name="connsiteY4" fmla="*/ 1897 h 11897"/>
+                <a:gd name="connsiteX5" fmla="*/ 0 w 10000"/>
+                <a:gd name="connsiteY5" fmla="*/ 0 h 11897"/>
+                <a:gd name="connsiteX0" fmla="*/ 0 w 10000"/>
+                <a:gd name="connsiteY0" fmla="*/ 135 h 12032"/>
+                <a:gd name="connsiteX1" fmla="*/ 0 w 10000"/>
+                <a:gd name="connsiteY1" fmla="*/ 12032 h 12032"/>
+                <a:gd name="connsiteX2" fmla="*/ 3477 w 10000"/>
+                <a:gd name="connsiteY2" fmla="*/ 5501 h 12032"/>
+                <a:gd name="connsiteX3" fmla="*/ 10000 w 10000"/>
+                <a:gd name="connsiteY3" fmla="*/ 5501 h 12032"/>
+                <a:gd name="connsiteX4" fmla="*/ 9993 w 10000"/>
+                <a:gd name="connsiteY4" fmla="*/ 0 h 12032"/>
+                <a:gd name="connsiteX5" fmla="*/ 0 w 10000"/>
+                <a:gd name="connsiteY5" fmla="*/ 135 h 12032"/>
+                <a:gd name="connsiteX0" fmla="*/ 0 w 10000"/>
+                <a:gd name="connsiteY0" fmla="*/ 0 h 11897"/>
+                <a:gd name="connsiteX1" fmla="*/ 0 w 10000"/>
+                <a:gd name="connsiteY1" fmla="*/ 11897 h 11897"/>
+                <a:gd name="connsiteX2" fmla="*/ 3477 w 10000"/>
+                <a:gd name="connsiteY2" fmla="*/ 5366 h 11897"/>
+                <a:gd name="connsiteX3" fmla="*/ 10000 w 10000"/>
+                <a:gd name="connsiteY3" fmla="*/ 5366 h 11897"/>
+                <a:gd name="connsiteX4" fmla="*/ 9993 w 10000"/>
+                <a:gd name="connsiteY4" fmla="*/ 23 h 11897"/>
+                <a:gd name="connsiteX5" fmla="*/ 0 w 10000"/>
+                <a:gd name="connsiteY5" fmla="*/ 0 h 11897"/>
+                <a:gd name="connsiteX0" fmla="*/ 0 w 10007"/>
+                <a:gd name="connsiteY0" fmla="*/ 0 h 11942"/>
+                <a:gd name="connsiteX1" fmla="*/ 7 w 10007"/>
+                <a:gd name="connsiteY1" fmla="*/ 11942 h 11942"/>
+                <a:gd name="connsiteX2" fmla="*/ 3484 w 10007"/>
+                <a:gd name="connsiteY2" fmla="*/ 5411 h 11942"/>
+                <a:gd name="connsiteX3" fmla="*/ 10007 w 10007"/>
+                <a:gd name="connsiteY3" fmla="*/ 5411 h 11942"/>
+                <a:gd name="connsiteX4" fmla="*/ 10000 w 10007"/>
+                <a:gd name="connsiteY4" fmla="*/ 68 h 11942"/>
+                <a:gd name="connsiteX5" fmla="*/ 0 w 10007"/>
+                <a:gd name="connsiteY5" fmla="*/ 0 h 11942"/>
+                <a:gd name="connsiteX0" fmla="*/ 1 w 10001"/>
+                <a:gd name="connsiteY0" fmla="*/ 0 h 11897"/>
+                <a:gd name="connsiteX1" fmla="*/ 1 w 10001"/>
+                <a:gd name="connsiteY1" fmla="*/ 11897 h 11897"/>
+                <a:gd name="connsiteX2" fmla="*/ 3478 w 10001"/>
+                <a:gd name="connsiteY2" fmla="*/ 5366 h 11897"/>
+                <a:gd name="connsiteX3" fmla="*/ 10001 w 10001"/>
+                <a:gd name="connsiteY3" fmla="*/ 5366 h 11897"/>
+                <a:gd name="connsiteX4" fmla="*/ 9994 w 10001"/>
+                <a:gd name="connsiteY4" fmla="*/ 23 h 11897"/>
+                <a:gd name="connsiteX5" fmla="*/ 1 w 10001"/>
+                <a:gd name="connsiteY5" fmla="*/ 0 h 11897"/>
+                <a:gd name="connsiteX0" fmla="*/ 1 w 10001"/>
+                <a:gd name="connsiteY0" fmla="*/ 0 h 11897"/>
+                <a:gd name="connsiteX1" fmla="*/ 1 w 10001"/>
+                <a:gd name="connsiteY1" fmla="*/ 11897 h 11897"/>
+                <a:gd name="connsiteX2" fmla="*/ 3478 w 10001"/>
+                <a:gd name="connsiteY2" fmla="*/ 5366 h 11897"/>
+                <a:gd name="connsiteX3" fmla="*/ 10001 w 10001"/>
+                <a:gd name="connsiteY3" fmla="*/ 5366 h 11897"/>
+                <a:gd name="connsiteX4" fmla="*/ 9994 w 10001"/>
+                <a:gd name="connsiteY4" fmla="*/ 23 h 11897"/>
+                <a:gd name="connsiteX5" fmla="*/ 1 w 10001"/>
+                <a:gd name="connsiteY5" fmla="*/ 0 h 11897"/>
+                <a:gd name="connsiteX0" fmla="*/ 0 w 10014"/>
+                <a:gd name="connsiteY0" fmla="*/ 0 h 11897"/>
+                <a:gd name="connsiteX1" fmla="*/ 14 w 10014"/>
+                <a:gd name="connsiteY1" fmla="*/ 11897 h 11897"/>
+                <a:gd name="connsiteX2" fmla="*/ 3491 w 10014"/>
+                <a:gd name="connsiteY2" fmla="*/ 5366 h 11897"/>
+                <a:gd name="connsiteX3" fmla="*/ 10014 w 10014"/>
+                <a:gd name="connsiteY3" fmla="*/ 5366 h 11897"/>
+                <a:gd name="connsiteX4" fmla="*/ 10007 w 10014"/>
+                <a:gd name="connsiteY4" fmla="*/ 23 h 11897"/>
+                <a:gd name="connsiteX5" fmla="*/ 0 w 10014"/>
+                <a:gd name="connsiteY5" fmla="*/ 0 h 11897"/>
+              </a:gdLst>
+              <a:ahLst/>
+              <a:cxnLst>
+                <a:cxn ang="0">
+                  <a:pos x="connsiteX0" y="connsiteY0"/>
+                </a:cxn>
+                <a:cxn ang="0">
+                  <a:pos x="connsiteX1" y="connsiteY1"/>
+                </a:cxn>
+                <a:cxn ang="0">
+                  <a:pos x="connsiteX2" y="connsiteY2"/>
+                </a:cxn>
+                <a:cxn ang="0">
+                  <a:pos x="connsiteX3" y="connsiteY3"/>
+                </a:cxn>
+                <a:cxn ang="0">
+                  <a:pos x="connsiteX4" y="connsiteY4"/>
+                </a:cxn>
+                <a:cxn ang="0">
+                  <a:pos x="connsiteX5" y="connsiteY5"/>
+                </a:cxn>
+              </a:cxnLst>
+              <a:rect l="l" t="t" r="r" b="b"/>
+              <a:pathLst>
+                <a:path w="10014" h="11897">
+                  <a:moveTo>
+                    <a:pt x="0" y="0"/>
+                  </a:moveTo>
+                  <a:cubicBezTo>
+                    <a:pt x="2" y="3981"/>
+                    <a:pt x="12" y="7916"/>
+                    <a:pt x="14" y="11897"/>
+                  </a:cubicBezTo>
+                  <a:lnTo>
+                    <a:pt x="3491" y="5366"/>
+                  </a:lnTo>
+                  <a:lnTo>
+                    <a:pt x="10014" y="5366"/>
+                  </a:lnTo>
+                  <a:cubicBezTo>
+                    <a:pt x="10012" y="3532"/>
+                    <a:pt x="10009" y="1857"/>
+                    <a:pt x="10007" y="23"/>
+                  </a:cubicBezTo>
+                  <a:lnTo>
+                    <a:pt x="0" y="0"/>
+                  </a:lnTo>
+                  <a:close/>
+                </a:path>
+              </a:pathLst>
+            </a:custGeom>
+            <a:solidFill>
+              <a:schemeClr val="accent1"/>
+            </a:solidFill>
+            <a:ln>
+              <a:noFill/>
+            </a:ln>
+            <a:extLst>
+              <a:ext uri="{91240B29-F687-4F45-9708-019B960494DF}">
+                <a14:hiddenLine xmlns:a14="http://schemas.microsoft.com/office/drawing/2010/main" w="9525">
+                  <a:solidFill>
+                    <a:srgbClr val="000000"/>
+                  </a:solidFill>
+                  <a:round/>
+                  <a:headEnd/>
+                  <a:tailEnd/>
+                </a14:hiddenLine>
+              </a:ext>
+            </a:extLst>
+          </p:spPr>
+          <p:txBody>
+            <a:bodyPr vert="horz" wrap="square" lIns="91440" tIns="45720" rIns="91440" bIns="45720" numCol="1" anchor="t" anchorCtr="0" compatLnSpc="1">
+              <a:prstTxWarp prst="textNoShape">
+                <a:avLst/>
+              </a:prstTxWarp>
+            </a:bodyPr>
+            <a:lstStyle/>
+            <a:p>
+              <a:endParaRPr lang="de-DE">
+                <a:latin typeface="Arial" panose="020B0604020202020204" pitchFamily="34" charset="0"/>
+                <a:cs typeface="Arial" panose="020B0604020202020204" pitchFamily="34" charset="0"/>
+              </a:endParaRPr>
+            </a:p>
+          </p:txBody>
+        </p:sp>
+      </p:grpSp>
+      <p:sp>
+        <p:nvSpPr>
+          <p:cNvPr id="22" name="Title 1"/>
+          <p:cNvSpPr>
+            <a:spLocks noGrp="1"/>
+          </p:cNvSpPr>
+          <p:nvPr>
+            <p:ph type="ctrTitle"/>
+          </p:nvPr>
+        </p:nvSpPr>
+        <p:spPr>
+          <a:xfrm>
+            <a:off x="3131840" y="1401874"/>
+            <a:ext cx="5760640" cy="1204306"/>
+          </a:xfrm>
+        </p:spPr>
+        <p:txBody>
+          <a:bodyPr bIns="9144" anchor="b"/>
+          <a:lstStyle>
+            <a:lvl1pPr algn="l">
+              <a:defRPr sz="3200">
+                <a:solidFill>
+                  <a:schemeClr val="accent1"/>
+                </a:solidFill>
+                <a:latin typeface="Arial" panose="020B0604020202020204" pitchFamily="34" charset="0"/>
+                <a:cs typeface="Arial" panose="020B0604020202020204" pitchFamily="34" charset="0"/>
+              </a:defRPr>
+            </a:lvl1pPr>
+          </a:lstStyle>
+          <a:p>
+            <a:r>
+              <a:rPr lang="de-DE" dirty="0"/>
+              <a:t>Titelmasterformat durch Klicken bearbeiten</a:t>
+            </a:r>
+            <a:endParaRPr lang="en-US" dirty="0"/>
+          </a:p>
+        </p:txBody>
+      </p:sp>
+      <p:sp>
+        <p:nvSpPr>
+          <p:cNvPr id="23" name="Subtitle 2"/>
+          <p:cNvSpPr>
+            <a:spLocks noGrp="1"/>
+          </p:cNvSpPr>
+          <p:nvPr>
+            <p:ph type="subTitle" idx="1"/>
+          </p:nvPr>
+        </p:nvSpPr>
+        <p:spPr>
+          <a:xfrm>
+            <a:off x="3131840" y="2784775"/>
+            <a:ext cx="5760639" cy="1094506"/>
+          </a:xfrm>
+        </p:spPr>
+        <p:txBody>
+          <a:bodyPr tIns="9144">
+            <a:normAutofit/>
+          </a:bodyPr>
+          <a:lstStyle>
+            <a:lvl1pPr marL="0" indent="0" algn="l">
+              <a:buNone/>
+              <a:defRPr kumimoji="0" lang="en-US" sz="2400" b="0" i="0" u="none" strike="noStrike" kern="1200" cap="none" spc="0" normalizeH="0" baseline="0" noProof="0" dirty="0" smtClean="0">
+                <a:ln>
+                  <a:noFill/>
+                </a:ln>
+                <a:solidFill>
+                  <a:schemeClr val="accent1"/>
+                </a:solidFill>
+                <a:effectLst/>
+                <a:uLnTx/>
+                <a:uFillTx/>
+                <a:latin typeface="Arial" panose="020B0604020202020204" pitchFamily="34" charset="0"/>
+                <a:ea typeface="Fira Sans Book" panose="020B0503050000020004" pitchFamily="34" charset="0"/>
+                <a:cs typeface="Arial" panose="020B0604020202020204" pitchFamily="34" charset="0"/>
+              </a:defRPr>
+            </a:lvl1pPr>
+            <a:lvl2pPr marL="457200" indent="0" algn="ctr">
+              <a:buNone/>
+              <a:defRPr>
+                <a:solidFill>
+                  <a:schemeClr val="tx1">
+                    <a:tint val="75000"/>
+                  </a:schemeClr>
+                </a:solidFill>
+              </a:defRPr>
+            </a:lvl2pPr>
+            <a:lvl3pPr marL="914400" indent="0" algn="ctr">
+              <a:buNone/>
+              <a:defRPr>
+                <a:solidFill>
+                  <a:schemeClr val="tx1">
+                    <a:tint val="75000"/>
+                  </a:schemeClr>
+                </a:solidFill>
+              </a:defRPr>
+            </a:lvl3pPr>
+            <a:lvl4pPr marL="1371600" indent="0" algn="ctr">
+              <a:buNone/>
+              <a:defRPr>
+                <a:solidFill>
+                  <a:schemeClr val="tx1">
+                    <a:tint val="75000"/>
+                  </a:schemeClr>
+                </a:solidFill>
+              </a:defRPr>
+            </a:lvl4pPr>
+            <a:lvl5pPr marL="1828800" indent="0" algn="ctr">
+              <a:buNone/>
+              <a:defRPr>
+                <a:solidFill>
+                  <a:schemeClr val="tx1">
+                    <a:tint val="75000"/>
+                  </a:schemeClr>
+                </a:solidFill>
+              </a:defRPr>
+            </a:lvl5pPr>
+            <a:lvl6pPr marL="2286000" indent="0" algn="ctr">
+              <a:buNone/>
+              <a:defRPr>
+                <a:solidFill>
+                  <a:schemeClr val="tx1">
+                    <a:tint val="75000"/>
+                  </a:schemeClr>
+                </a:solidFill>
+              </a:defRPr>
+            </a:lvl6pPr>
+            <a:lvl7pPr marL="2743200" indent="0" algn="ctr">
+              <a:buNone/>
+              <a:defRPr>
+                <a:solidFill>
+                  <a:schemeClr val="tx1">
+                    <a:tint val="75000"/>
+                  </a:schemeClr>
+                </a:solidFill>
+              </a:defRPr>
+            </a:lvl7pPr>
+            <a:lvl8pPr marL="3200400" indent="0" algn="ctr">
+              <a:buNone/>
+              <a:defRPr>
+                <a:solidFill>
+                  <a:schemeClr val="tx1">
+                    <a:tint val="75000"/>
+                  </a:schemeClr>
+                </a:solidFill>
+              </a:defRPr>
+            </a:lvl8pPr>
+            <a:lvl9pPr marL="3657600" indent="0" algn="ctr">
+              <a:buNone/>
+              <a:defRPr>
+                <a:solidFill>
+                  <a:schemeClr val="tx1">
+                    <a:tint val="75000"/>
+                  </a:schemeClr>
+                </a:solidFill>
+              </a:defRPr>
+            </a:lvl9pPr>
+          </a:lstStyle>
+          <a:p>
+            <a:pPr marL="0" marR="0" lvl="0" indent="0" algn="l" defTabSz="914400" rtl="0" eaLnBrk="1" fontAlgn="auto" latinLnBrk="0" hangingPunct="1">
+              <a:lnSpc>
+                <a:spcPct val="100000"/>
+              </a:lnSpc>
+              <a:spcBef>
+                <a:spcPts val="0"/>
+              </a:spcBef>
+              <a:spcAft>
+                <a:spcPts val="0"/>
+              </a:spcAft>
+              <a:buClr>
+                <a:schemeClr val="accent1"/>
+              </a:buClr>
+              <a:buSzPct val="100000"/>
+              <a:buFont typeface="Arial" pitchFamily="34" charset="0"/>
+              <a:buNone/>
+              <a:tabLst/>
+              <a:defRPr/>
+            </a:pPr>
+            <a:r>
+              <a:rPr lang="de-DE" dirty="0"/>
+              <a:t>Formatvorlage des Untertitelmasters durch Klicken bearbeiten</a:t>
+            </a:r>
+            <a:endParaRPr lang="en-US" dirty="0"/>
+          </a:p>
+        </p:txBody>
+      </p:sp>
+      <p:sp>
+        <p:nvSpPr>
+          <p:cNvPr id="26" name="Textplatzhalter 47"/>
+          <p:cNvSpPr>
+            <a:spLocks noGrp="1"/>
+          </p:cNvSpPr>
+          <p:nvPr>
+            <p:ph type="body" sz="quarter" idx="14" hasCustomPrompt="1"/>
+          </p:nvPr>
+        </p:nvSpPr>
+        <p:spPr>
+          <a:xfrm>
+            <a:off x="3131840" y="4155926"/>
+            <a:ext cx="5760640" cy="288032"/>
+          </a:xfrm>
+        </p:spPr>
+        <p:txBody>
+          <a:bodyPr>
+            <a:normAutofit/>
+          </a:bodyPr>
+          <a:lstStyle>
+            <a:lvl1pPr marL="0" indent="0">
+              <a:lnSpc>
+                <a:spcPct val="100000"/>
+              </a:lnSpc>
+              <a:spcBef>
+                <a:spcPts val="0"/>
+              </a:spcBef>
+              <a:buNone/>
+              <a:defRPr sz="1400" b="0">
+                <a:solidFill>
+                  <a:schemeClr val="bg1"/>
+                </a:solidFill>
+                <a:latin typeface="Arial" panose="020B0604020202020204" pitchFamily="34" charset="0"/>
+                <a:cs typeface="Arial" panose="020B0604020202020204" pitchFamily="34" charset="0"/>
+              </a:defRPr>
+            </a:lvl1pPr>
+          </a:lstStyle>
+          <a:p>
+            <a:pPr lvl="0"/>
+            <a:r>
+              <a:rPr lang="de-DE" dirty="0"/>
+              <a:t>Ort | Datum</a:t>
+            </a:r>
+          </a:p>
+        </p:txBody>
+      </p:sp>
+      <p:sp>
+        <p:nvSpPr>
+          <p:cNvPr id="27" name="Textplatzhalter 47"/>
+          <p:cNvSpPr>
+            <a:spLocks noGrp="1"/>
+          </p:cNvSpPr>
+          <p:nvPr>
+            <p:ph type="body" sz="quarter" idx="15" hasCustomPrompt="1"/>
+          </p:nvPr>
+        </p:nvSpPr>
+        <p:spPr>
+          <a:xfrm>
+            <a:off x="3131840" y="4515966"/>
+            <a:ext cx="5760640" cy="288032"/>
+          </a:xfrm>
+        </p:spPr>
+        <p:txBody>
+          <a:bodyPr>
+            <a:normAutofit/>
+          </a:bodyPr>
+          <a:lstStyle>
+            <a:lvl1pPr marL="0" indent="0">
+              <a:lnSpc>
+                <a:spcPct val="100000"/>
+              </a:lnSpc>
+              <a:spcBef>
+                <a:spcPts val="0"/>
+              </a:spcBef>
+              <a:buNone/>
+              <a:defRPr sz="1400" b="0">
+                <a:solidFill>
+                  <a:schemeClr val="bg1"/>
+                </a:solidFill>
+                <a:latin typeface="Arial" panose="020B0604020202020204" pitchFamily="34" charset="0"/>
+                <a:cs typeface="Arial" panose="020B0604020202020204" pitchFamily="34" charset="0"/>
+              </a:defRPr>
+            </a:lvl1pPr>
+          </a:lstStyle>
+          <a:p>
+            <a:pPr lvl="0"/>
+            <a:r>
+              <a:rPr lang="de-DE" dirty="0"/>
+              <a:t>Vortragender</a:t>
+            </a:r>
+          </a:p>
+        </p:txBody>
+      </p:sp>
+      <p:sp>
+        <p:nvSpPr>
+          <p:cNvPr id="28" name="Textplatzhalter 47"/>
+          <p:cNvSpPr>
+            <a:spLocks noGrp="1"/>
+          </p:cNvSpPr>
+          <p:nvPr>
+            <p:ph type="body" sz="quarter" idx="12" hasCustomPrompt="1"/>
+          </p:nvPr>
+        </p:nvSpPr>
+        <p:spPr>
+          <a:xfrm>
+            <a:off x="3131840" y="267494"/>
+            <a:ext cx="5760640" cy="288032"/>
+          </a:xfrm>
+        </p:spPr>
+        <p:txBody>
+          <a:bodyPr>
+            <a:normAutofit/>
+          </a:bodyPr>
+          <a:lstStyle>
+            <a:lvl1pPr marL="0" indent="0">
+              <a:lnSpc>
+                <a:spcPct val="100000"/>
+              </a:lnSpc>
+              <a:spcBef>
+                <a:spcPts val="0"/>
+              </a:spcBef>
+              <a:buNone/>
+              <a:defRPr sz="1400" b="1">
+                <a:solidFill>
+                  <a:schemeClr val="bg1"/>
+                </a:solidFill>
+                <a:latin typeface="Arial" panose="020B0604020202020204" pitchFamily="34" charset="0"/>
+                <a:cs typeface="Arial" panose="020B0604020202020204" pitchFamily="34" charset="0"/>
+              </a:defRPr>
+            </a:lvl1pPr>
+          </a:lstStyle>
+          <a:p>
+            <a:pPr lvl="0"/>
+            <a:r>
+              <a:rPr lang="de-DE" dirty="0"/>
+              <a:t>Klinik</a:t>
+            </a:r>
+          </a:p>
+        </p:txBody>
+      </p:sp>
+      <p:sp>
+        <p:nvSpPr>
+          <p:cNvPr id="29" name="Textplatzhalter 47"/>
+          <p:cNvSpPr>
+            <a:spLocks noGrp="1"/>
+          </p:cNvSpPr>
+          <p:nvPr>
+            <p:ph type="body" sz="quarter" idx="13" hasCustomPrompt="1"/>
+          </p:nvPr>
+        </p:nvSpPr>
+        <p:spPr>
+          <a:xfrm>
+            <a:off x="3131840" y="555526"/>
+            <a:ext cx="5760640" cy="288032"/>
+          </a:xfrm>
+        </p:spPr>
+        <p:txBody>
+          <a:bodyPr>
+            <a:normAutofit/>
+          </a:bodyPr>
+          <a:lstStyle>
+            <a:lvl1pPr marL="0" indent="0">
+              <a:lnSpc>
+                <a:spcPct val="100000"/>
+              </a:lnSpc>
+              <a:spcBef>
+                <a:spcPts val="0"/>
+              </a:spcBef>
+              <a:buNone/>
+              <a:defRPr sz="1400" b="0">
+                <a:solidFill>
+                  <a:schemeClr val="bg1"/>
+                </a:solidFill>
+                <a:latin typeface="Arial" panose="020B0604020202020204" pitchFamily="34" charset="0"/>
+                <a:cs typeface="Arial" panose="020B0604020202020204" pitchFamily="34" charset="0"/>
+              </a:defRPr>
+            </a:lvl1pPr>
+          </a:lstStyle>
+          <a:p>
+            <a:pPr lvl="0"/>
+            <a:r>
+              <a:rPr lang="de-DE" dirty="0"/>
+              <a:t>Abteilung</a:t>
+            </a:r>
+          </a:p>
+        </p:txBody>
+      </p:sp>
+      <p:sp>
+        <p:nvSpPr>
+          <p:cNvPr id="20" name="Rechteck 19"/>
+          <p:cNvSpPr/>
+          <p:nvPr userDrawn="1"/>
+        </p:nvSpPr>
+        <p:spPr>
+          <a:xfrm rot="5400000">
+            <a:off x="-1198393" y="594519"/>
+            <a:ext cx="2898189" cy="515944"/>
+          </a:xfrm>
+          <a:prstGeom prst="rect">
+            <a:avLst/>
+          </a:prstGeom>
+          <a:ln>
+            <a:noFill/>
+          </a:ln>
+        </p:spPr>
+        <p:style>
+          <a:lnRef idx="2">
+            <a:schemeClr val="accent1">
+              <a:shade val="50000"/>
+            </a:schemeClr>
+          </a:lnRef>
+          <a:fillRef idx="1">
+            <a:schemeClr val="accent1"/>
+          </a:fillRef>
+          <a:effectRef idx="0">
+            <a:schemeClr val="accent1"/>
+          </a:effectRef>
+          <a:fontRef idx="minor">
+            <a:schemeClr val="lt1"/>
+          </a:fontRef>
+        </p:style>
+        <p:txBody>
+          <a:bodyPr rtlCol="0" anchor="ctr"/>
+          <a:lstStyle/>
+          <a:p>
+            <a:pPr algn="ctr"/>
+            <a:endParaRPr lang="de-DE">
+              <a:latin typeface="Arial" panose="020B0604020202020204" pitchFamily="34" charset="0"/>
+              <a:cs typeface="Arial" panose="020B0604020202020204" pitchFamily="34" charset="0"/>
+            </a:endParaRPr>
+          </a:p>
+        </p:txBody>
+      </p:sp>
+      <p:pic>
+        <p:nvPicPr>
+          <p:cNvPr id="2" name="Grafik 1"/>
+          <p:cNvPicPr>
+            <a:picLocks noChangeAspect="1"/>
+          </p:cNvPicPr>
+          <p:nvPr userDrawn="1"/>
+        </p:nvPicPr>
+        <p:blipFill>
+          <a:blip r:embed="rId2" cstate="print">
+            <a:extLst>
+              <a:ext uri="{28A0092B-C50C-407E-A947-70E740481C1C}">
+                <a14:useLocalDpi xmlns:a14="http://schemas.microsoft.com/office/drawing/2010/main" val="0"/>
+              </a:ext>
+            </a:extLst>
+          </a:blip>
+          <a:stretch>
+            <a:fillRect/>
+          </a:stretch>
+        </p:blipFill>
+        <p:spPr>
+          <a:xfrm>
+            <a:off x="290843" y="339503"/>
+            <a:ext cx="2155462" cy="1062372"/>
+          </a:xfrm>
+          <a:prstGeom prst="rect">
+            <a:avLst/>
+          </a:prstGeom>
+        </p:spPr>
+      </p:pic>
+      <p:grpSp>
+        <p:nvGrpSpPr>
+          <p:cNvPr id="11" name="Group 22"/>
+          <p:cNvGrpSpPr>
+            <a:grpSpLocks noChangeAspect="1"/>
+          </p:cNvGrpSpPr>
+          <p:nvPr userDrawn="1"/>
+        </p:nvGrpSpPr>
+        <p:grpSpPr bwMode="auto">
+          <a:xfrm>
+            <a:off x="-7268" y="1873197"/>
+            <a:ext cx="1595438" cy="1760538"/>
+            <a:chOff x="0" y="1636"/>
+            <a:chExt cx="1005" cy="1109"/>
+          </a:xfrm>
+        </p:grpSpPr>
+        <p:sp>
+          <p:nvSpPr>
+            <p:cNvPr id="12" name="Freeform 24"/>
+            <p:cNvSpPr>
+              <a:spLocks/>
+            </p:cNvSpPr>
+            <p:nvPr userDrawn="1"/>
+          </p:nvSpPr>
+          <p:spPr bwMode="auto">
+            <a:xfrm>
+              <a:off x="308" y="1636"/>
+              <a:ext cx="697" cy="930"/>
+            </a:xfrm>
+            <a:custGeom>
+              <a:avLst/>
+              <a:gdLst>
+                <a:gd name="T0" fmla="*/ 0 w 697"/>
+                <a:gd name="T1" fmla="*/ 930 h 930"/>
+                <a:gd name="T2" fmla="*/ 0 w 697"/>
+                <a:gd name="T3" fmla="*/ 403 h 930"/>
+                <a:gd name="T4" fmla="*/ 697 w 697"/>
+                <a:gd name="T5" fmla="*/ 0 h 930"/>
+                <a:gd name="T6" fmla="*/ 697 w 697"/>
+                <a:gd name="T7" fmla="*/ 527 h 930"/>
+                <a:gd name="T8" fmla="*/ 0 w 697"/>
+                <a:gd name="T9" fmla="*/ 930 h 930"/>
+              </a:gdLst>
+              <a:ahLst/>
+              <a:cxnLst>
+                <a:cxn ang="0">
+                  <a:pos x="T0" y="T1"/>
+                </a:cxn>
+                <a:cxn ang="0">
+                  <a:pos x="T2" y="T3"/>
+                </a:cxn>
+                <a:cxn ang="0">
+                  <a:pos x="T4" y="T5"/>
+                </a:cxn>
+                <a:cxn ang="0">
+                  <a:pos x="T6" y="T7"/>
+                </a:cxn>
+                <a:cxn ang="0">
+                  <a:pos x="T8" y="T9"/>
+                </a:cxn>
+              </a:cxnLst>
+              <a:rect l="0" t="0" r="r" b="b"/>
+              <a:pathLst>
+                <a:path w="697" h="930">
+                  <a:moveTo>
+                    <a:pt x="0" y="930"/>
+                  </a:moveTo>
+                  <a:lnTo>
+                    <a:pt x="0" y="403"/>
+                  </a:lnTo>
+                  <a:lnTo>
+                    <a:pt x="697" y="0"/>
+                  </a:lnTo>
+                  <a:lnTo>
+                    <a:pt x="697" y="527"/>
+                  </a:lnTo>
+                  <a:lnTo>
+                    <a:pt x="0" y="930"/>
+                  </a:lnTo>
+                  <a:close/>
+                </a:path>
+              </a:pathLst>
+            </a:custGeom>
+            <a:solidFill>
+              <a:srgbClr val="8AD53D"/>
+            </a:solidFill>
+            <a:ln>
+              <a:noFill/>
+            </a:ln>
+            <a:extLst>
+              <a:ext uri="{91240B29-F687-4F45-9708-019B960494DF}">
+                <a14:hiddenLine xmlns:a14="http://schemas.microsoft.com/office/drawing/2010/main" w="9525">
+                  <a:solidFill>
+                    <a:srgbClr val="000000"/>
+                  </a:solidFill>
+                  <a:round/>
+                  <a:headEnd/>
+                  <a:tailEnd/>
+                </a14:hiddenLine>
+              </a:ext>
+            </a:extLst>
+          </p:spPr>
+          <p:txBody>
+            <a:bodyPr vert="horz" wrap="square" lIns="91440" tIns="45720" rIns="91440" bIns="45720" numCol="1" anchor="t" anchorCtr="0" compatLnSpc="1">
+              <a:prstTxWarp prst="textNoShape">
+                <a:avLst/>
+              </a:prstTxWarp>
+            </a:bodyPr>
+            <a:lstStyle/>
+            <a:p>
+              <a:endParaRPr lang="de-DE">
+                <a:latin typeface="Arial" panose="020B0604020202020204" pitchFamily="34" charset="0"/>
+                <a:cs typeface="Arial" panose="020B0604020202020204" pitchFamily="34" charset="0"/>
+              </a:endParaRPr>
+            </a:p>
+          </p:txBody>
+        </p:sp>
+        <p:sp>
+          <p:nvSpPr>
+            <p:cNvPr id="14" name="Freeform 26"/>
+            <p:cNvSpPr>
+              <a:spLocks/>
+            </p:cNvSpPr>
+            <p:nvPr userDrawn="1"/>
+          </p:nvSpPr>
+          <p:spPr bwMode="auto">
+            <a:xfrm>
+              <a:off x="0" y="2389"/>
+              <a:ext cx="308" cy="356"/>
+            </a:xfrm>
+            <a:custGeom>
+              <a:avLst/>
+              <a:gdLst>
+                <a:gd name="T0" fmla="*/ 0 w 308"/>
+                <a:gd name="T1" fmla="*/ 0 h 356"/>
+                <a:gd name="T2" fmla="*/ 0 w 308"/>
+                <a:gd name="T3" fmla="*/ 356 h 356"/>
+                <a:gd name="T4" fmla="*/ 308 w 308"/>
+                <a:gd name="T5" fmla="*/ 177 h 356"/>
+                <a:gd name="T6" fmla="*/ 0 w 308"/>
+                <a:gd name="T7" fmla="*/ 0 h 356"/>
+              </a:gdLst>
+              <a:ahLst/>
+              <a:cxnLst>
+                <a:cxn ang="0">
+                  <a:pos x="T0" y="T1"/>
+                </a:cxn>
+                <a:cxn ang="0">
+                  <a:pos x="T2" y="T3"/>
+                </a:cxn>
+                <a:cxn ang="0">
+                  <a:pos x="T4" y="T5"/>
+                </a:cxn>
+                <a:cxn ang="0">
+                  <a:pos x="T6" y="T7"/>
+                </a:cxn>
+              </a:cxnLst>
+              <a:rect l="0" t="0" r="r" b="b"/>
+              <a:pathLst>
+                <a:path w="308" h="356">
+                  <a:moveTo>
+                    <a:pt x="0" y="0"/>
+                  </a:moveTo>
+                  <a:lnTo>
+                    <a:pt x="0" y="356"/>
+                  </a:lnTo>
+                  <a:lnTo>
+                    <a:pt x="308" y="177"/>
+                  </a:lnTo>
+                  <a:lnTo>
+                    <a:pt x="0" y="0"/>
+                  </a:lnTo>
+                  <a:close/>
+                </a:path>
+              </a:pathLst>
+            </a:custGeom>
+            <a:solidFill>
+              <a:srgbClr val="0054A3"/>
+            </a:solidFill>
+            <a:ln>
+              <a:noFill/>
+            </a:ln>
+            <a:extLst>
+              <a:ext uri="{91240B29-F687-4F45-9708-019B960494DF}">
+                <a14:hiddenLine xmlns:a14="http://schemas.microsoft.com/office/drawing/2010/main" w="9525">
+                  <a:solidFill>
+                    <a:srgbClr val="000000"/>
+                  </a:solidFill>
+                  <a:round/>
+                  <a:headEnd/>
+                  <a:tailEnd/>
+                </a14:hiddenLine>
+              </a:ext>
+            </a:extLst>
+          </p:spPr>
+          <p:txBody>
+            <a:bodyPr vert="horz" wrap="square" lIns="91440" tIns="45720" rIns="91440" bIns="45720" numCol="1" anchor="t" anchorCtr="0" compatLnSpc="1">
+              <a:prstTxWarp prst="textNoShape">
+                <a:avLst/>
+              </a:prstTxWarp>
+            </a:bodyPr>
+            <a:lstStyle/>
+            <a:p>
+              <a:endParaRPr lang="de-DE">
+                <a:latin typeface="Arial" panose="020B0604020202020204" pitchFamily="34" charset="0"/>
+                <a:cs typeface="Arial" panose="020B0604020202020204" pitchFamily="34" charset="0"/>
+              </a:endParaRPr>
+            </a:p>
+          </p:txBody>
+        </p:sp>
+        <p:sp>
+          <p:nvSpPr>
+            <p:cNvPr id="13" name="Freeform 25"/>
+            <p:cNvSpPr>
+              <a:spLocks/>
+            </p:cNvSpPr>
+            <p:nvPr userDrawn="1"/>
+          </p:nvSpPr>
+          <p:spPr bwMode="auto">
+            <a:xfrm>
+              <a:off x="0" y="1861"/>
+              <a:ext cx="308" cy="705"/>
+            </a:xfrm>
+            <a:custGeom>
+              <a:avLst/>
+              <a:gdLst>
+                <a:gd name="T0" fmla="*/ 0 w 308"/>
+                <a:gd name="T1" fmla="*/ 0 h 705"/>
+                <a:gd name="T2" fmla="*/ 0 w 308"/>
+                <a:gd name="T3" fmla="*/ 528 h 705"/>
+                <a:gd name="T4" fmla="*/ 308 w 308"/>
+                <a:gd name="T5" fmla="*/ 705 h 705"/>
+                <a:gd name="T6" fmla="*/ 308 w 308"/>
+                <a:gd name="T7" fmla="*/ 178 h 705"/>
+                <a:gd name="T8" fmla="*/ 0 w 308"/>
+                <a:gd name="T9" fmla="*/ 0 h 705"/>
+              </a:gdLst>
+              <a:ahLst/>
+              <a:cxnLst>
+                <a:cxn ang="0">
+                  <a:pos x="T0" y="T1"/>
+                </a:cxn>
+                <a:cxn ang="0">
+                  <a:pos x="T2" y="T3"/>
+                </a:cxn>
+                <a:cxn ang="0">
+                  <a:pos x="T4" y="T5"/>
+                </a:cxn>
+                <a:cxn ang="0">
+                  <a:pos x="T6" y="T7"/>
+                </a:cxn>
+                <a:cxn ang="0">
+                  <a:pos x="T8" y="T9"/>
+                </a:cxn>
+              </a:cxnLst>
+              <a:rect l="0" t="0" r="r" b="b"/>
+              <a:pathLst>
+                <a:path w="308" h="705">
+                  <a:moveTo>
+                    <a:pt x="0" y="0"/>
+                  </a:moveTo>
+                  <a:lnTo>
+                    <a:pt x="0" y="528"/>
+                  </a:lnTo>
+                  <a:lnTo>
+                    <a:pt x="308" y="705"/>
+                  </a:lnTo>
+                  <a:lnTo>
+                    <a:pt x="308" y="178"/>
+                  </a:lnTo>
+                  <a:lnTo>
+                    <a:pt x="0" y="0"/>
+                  </a:lnTo>
+                  <a:close/>
+                </a:path>
+              </a:pathLst>
+            </a:custGeom>
+            <a:solidFill>
+              <a:srgbClr val="00ACED"/>
+            </a:solidFill>
+            <a:ln>
+              <a:noFill/>
+            </a:ln>
+            <a:extLst>
+              <a:ext uri="{91240B29-F687-4F45-9708-019B960494DF}">
+                <a14:hiddenLine xmlns:a14="http://schemas.microsoft.com/office/drawing/2010/main" w="9525">
+                  <a:solidFill>
+                    <a:srgbClr val="000000"/>
+                  </a:solidFill>
+                  <a:round/>
+                  <a:headEnd/>
+                  <a:tailEnd/>
+                </a14:hiddenLine>
+              </a:ext>
+            </a:extLst>
+          </p:spPr>
+          <p:txBody>
+            <a:bodyPr vert="horz" wrap="square" lIns="91440" tIns="45720" rIns="91440" bIns="45720" numCol="1" anchor="t" anchorCtr="0" compatLnSpc="1">
+              <a:prstTxWarp prst="textNoShape">
+                <a:avLst/>
+              </a:prstTxWarp>
+            </a:bodyPr>
+            <a:lstStyle/>
+            <a:p>
+              <a:endParaRPr lang="de-DE">
+                <a:latin typeface="Arial" panose="020B0604020202020204" pitchFamily="34" charset="0"/>
+                <a:cs typeface="Arial" panose="020B0604020202020204" pitchFamily="34" charset="0"/>
+              </a:endParaRPr>
+            </a:p>
+          </p:txBody>
+        </p:sp>
+      </p:grpSp>
+    </p:spTree>
+    <p:extLst>
+      <p:ext uri="{BB962C8B-B14F-4D97-AF65-F5344CB8AC3E}">
+        <p14:creationId xmlns:p14="http://schemas.microsoft.com/office/powerpoint/2010/main" val="3401629619"/>
       </p:ext>
     </p:extLst>
   </p:cSld>
@@ -4442,7 +5606,7 @@
           </a:ln>
           <a:extLst>
             <a:ext uri="{C572A759-6A51-4108-AA02-DFA0A04FC94B}">
-              <ma14:wrappingTextBoxFlag xmlns="" xmlns:m="http://schemas.openxmlformats.org/officeDocument/2006/math" xmlns:a14="http://schemas.microsoft.com/office/drawing/2010/main" xmlns:ma14="http://schemas.microsoft.com/office/mac/drawingml/2011/main" val="1"/>
+              <ma14:wrappingTextBoxFlag xmlns:ma14="http://schemas.microsoft.com/office/mac/drawingml/2011/main" xmlns:a14="http://schemas.microsoft.com/office/drawing/2010/main" xmlns:m="http://schemas.openxmlformats.org/officeDocument/2006/math" xmlns="" val="1"/>
             </a:ext>
           </a:extLst>
         </p:spPr>
@@ -4481,7 +5645,7 @@
           </a:ln>
           <a:extLst>
             <a:ext uri="{C572A759-6A51-4108-AA02-DFA0A04FC94B}">
-              <ma14:wrappingTextBoxFlag xmlns="" xmlns:m="http://schemas.openxmlformats.org/officeDocument/2006/math" xmlns:a14="http://schemas.microsoft.com/office/drawing/2010/main" xmlns:ma14="http://schemas.microsoft.com/office/mac/drawingml/2011/main" val="1"/>
+              <ma14:wrappingTextBoxFlag xmlns:ma14="http://schemas.microsoft.com/office/mac/drawingml/2011/main" xmlns:a14="http://schemas.microsoft.com/office/drawing/2010/main" xmlns:m="http://schemas.openxmlformats.org/officeDocument/2006/math" xmlns="" val="1"/>
             </a:ext>
           </a:extLst>
         </p:spPr>
@@ -4586,6 +5750,7 @@
     <p:sldLayoutId id="2147483663" r:id="rId14"/>
     <p:sldLayoutId id="2147483664" r:id="rId15"/>
     <p:sldLayoutId id="2147483665" r:id="rId16"/>
+    <p:sldLayoutId id="2147483666" r:id="rId17"/>
   </p:sldLayoutIdLst>
   <p:transition spd="med"/>
   <p:txStyles>
@@ -5600,7 +6765,7 @@
           </a:ln>
           <a:extLst>
             <a:ext uri="{C572A759-6A51-4108-AA02-DFA0A04FC94B}">
-              <ma14:wrappingTextBoxFlag xmlns="" xmlns:m="http://schemas.openxmlformats.org/officeDocument/2006/math" xmlns:a14="http://schemas.microsoft.com/office/drawing/2010/main" xmlns:ma14="http://schemas.microsoft.com/office/mac/drawingml/2011/main" val="1"/>
+              <ma14:wrappingTextBoxFlag xmlns:ma14="http://schemas.microsoft.com/office/mac/drawingml/2011/main" xmlns:a14="http://schemas.microsoft.com/office/drawing/2010/main" xmlns:m="http://schemas.openxmlformats.org/officeDocument/2006/math" xmlns="" val="1"/>
             </a:ext>
           </a:extLst>
         </p:spPr>
@@ -5616,80 +6781,16 @@
           <a:p>
             <a:r>
               <a:rPr lang="en-US" sz="1800" dirty="0"/>
-              <a:t>Digital Posters at the </a:t>
-            </a:r>
-            <a:r>
-              <a:rPr lang="en-US" sz="1800" dirty="0" smtClean="0"/>
-              <a:t>2025 Annual Meeting aim </a:t>
-            </a:r>
+              <a:t>Digital Posters at the 2025 Annual Meeting aim to offer interactive discussions to varying audiences with a consistent format for better browsing,  navigation, and offline viewing.  </a:t>
+            </a:r>
+          </a:p>
+          <a:p>
+            <a:endParaRPr lang="en-US" sz="1800" dirty="0"/>
+          </a:p>
+          <a:p>
             <a:r>
               <a:rPr lang="en-US" sz="1800" dirty="0"/>
-              <a:t>to offer interactive discussions to varying </a:t>
-            </a:r>
-            <a:r>
-              <a:rPr lang="en-US" sz="1800" dirty="0" smtClean="0"/>
-              <a:t>audiences with a </a:t>
-            </a:r>
-            <a:r>
-              <a:rPr lang="en-US" sz="1800" dirty="0"/>
-              <a:t>consistent format for better browsing,  </a:t>
-            </a:r>
-            <a:r>
-              <a:rPr lang="en-US" sz="1800" dirty="0" smtClean="0"/>
-              <a:t>navigation, </a:t>
-            </a:r>
-            <a:r>
-              <a:rPr lang="en-US" sz="1800" dirty="0"/>
-              <a:t>and </a:t>
-            </a:r>
-            <a:r>
-              <a:rPr lang="en-US" sz="1800" dirty="0" smtClean="0"/>
-              <a:t>offline </a:t>
-            </a:r>
-            <a:r>
-              <a:rPr lang="en-US" sz="1800" dirty="0"/>
-              <a:t>viewing.  </a:t>
-            </a:r>
-          </a:p>
-          <a:p>
-            <a:endParaRPr lang="en-US" sz="1800" dirty="0"/>
-          </a:p>
-          <a:p>
-            <a:r>
-              <a:rPr lang="en-US" sz="1800" dirty="0"/>
-              <a:t>This is a </a:t>
-            </a:r>
-            <a:r>
-              <a:rPr lang="en-US" sz="1800" dirty="0" smtClean="0"/>
-              <a:t>simple slide </a:t>
-            </a:r>
-            <a:r>
-              <a:rPr lang="en-US" sz="1800" dirty="0"/>
-              <a:t>template – you should </a:t>
-            </a:r>
-            <a:r>
-              <a:rPr lang="en-US" sz="1800" dirty="0" smtClean="0"/>
-              <a:t>modify </a:t>
-            </a:r>
-            <a:r>
-              <a:rPr lang="en-US" sz="1800" dirty="0"/>
-              <a:t>the styles, fonts, and </a:t>
-            </a:r>
-            <a:r>
-              <a:rPr lang="en-US" sz="1800" dirty="0" smtClean="0"/>
-              <a:t>layout to make it unique to your presentation. Add </a:t>
-            </a:r>
-            <a:r>
-              <a:rPr lang="en-US" sz="1800" dirty="0"/>
-              <a:t>images, </a:t>
-            </a:r>
-            <a:r>
-              <a:rPr lang="en-US" sz="1800" dirty="0" smtClean="0"/>
-              <a:t>videos, </a:t>
-            </a:r>
-            <a:r>
-              <a:rPr lang="en-US" sz="1800" dirty="0"/>
-              <a:t>and animation as you wish!</a:t>
+              <a:t>This is a simple slide template – you should modify the styles, fonts, and layout to make it unique to your presentation. Add images, videos, and animation as you wish!</a:t>
             </a:r>
           </a:p>
         </p:txBody>
@@ -5719,7 +6820,7 @@
           </a:ln>
           <a:extLst>
             <a:ext uri="{C572A759-6A51-4108-AA02-DFA0A04FC94B}">
-              <ma14:wrappingTextBoxFlag xmlns="" xmlns:m="http://schemas.openxmlformats.org/officeDocument/2006/math" xmlns:a14="http://schemas.microsoft.com/office/drawing/2010/main" xmlns:ma14="http://schemas.microsoft.com/office/mac/drawingml/2011/main" val="1"/>
+              <ma14:wrappingTextBoxFlag xmlns:ma14="http://schemas.microsoft.com/office/mac/drawingml/2011/main" xmlns:a14="http://schemas.microsoft.com/office/drawing/2010/main" xmlns:m="http://schemas.openxmlformats.org/officeDocument/2006/math" xmlns="" val="1"/>
             </a:ext>
           </a:extLst>
         </p:spPr>
@@ -5735,49 +6836,21 @@
           <a:p>
             <a:pPr algn="ctr"/>
             <a:r>
-              <a:rPr lang="en-US" sz="2000" dirty="0" smtClean="0">
-                <a:hlinkClick r:id="rId4"/>
-              </a:rPr>
-              <a:t>Guidelines for </a:t>
-            </a:r>
-            <a:r>
               <a:rPr lang="en-US" sz="2000" dirty="0">
                 <a:hlinkClick r:id="rId4"/>
               </a:rPr>
-              <a:t>poster submissions </a:t>
-            </a:r>
-            <a:r>
-              <a:rPr lang="en-US" sz="2000" dirty="0" smtClean="0">
-                <a:hlinkClick r:id="rId4"/>
-              </a:rPr>
-              <a:t>are </a:t>
-            </a:r>
-            <a:r>
-              <a:rPr lang="en-US" sz="2000" dirty="0">
-                <a:hlinkClick r:id="rId4"/>
-              </a:rPr>
-              <a:t>available </a:t>
-            </a:r>
-            <a:r>
-              <a:rPr lang="en-US" sz="2000" dirty="0" smtClean="0">
-                <a:hlinkClick r:id="rId4"/>
-              </a:rPr>
-              <a:t>here</a:t>
-            </a:r>
-            <a:r>
-              <a:rPr lang="en-US" sz="2000" dirty="0" smtClean="0"/>
+              <a:t>Guidelines for poster submissions are available here</a:t>
+            </a:r>
+            <a:r>
+              <a:rPr lang="en-US" sz="2000" dirty="0"/>
               <a:t>.</a:t>
             </a:r>
             <a:br>
-              <a:rPr lang="en-US" sz="2000" dirty="0" smtClean="0"/>
+              <a:rPr lang="en-US" sz="2000" dirty="0"/>
             </a:br>
             <a:r>
-              <a:rPr lang="en-US" sz="2000" dirty="0" smtClean="0"/>
-              <a:t>Speaker </a:t>
-            </a:r>
-            <a:r>
               <a:rPr lang="en-US" sz="2000" dirty="0"/>
-              <a:t>Notes on these slides have some comments to help you.</a:t>
+              <a:t>Speaker Notes on these slides have some comments to help you.</a:t>
             </a:r>
           </a:p>
         </p:txBody>
@@ -5937,7 +7010,7 @@
           <a:p>
             <a:r>
               <a:rPr lang="en-US" dirty="0"/>
-              <a:t>Experimental Setup</a:t>
+              <a:t>Theory</a:t>
             </a:r>
             <a:endParaRPr dirty="0"/>
           </a:p>
@@ -5991,7 +7064,7 @@
     </p:spTree>
     <p:extLst>
       <p:ext uri="{BB962C8B-B14F-4D97-AF65-F5344CB8AC3E}">
-        <p14:creationId xmlns:p14="http://schemas.microsoft.com/office/powerpoint/2010/main" val="2715737814"/>
+        <p14:creationId xmlns:p14="http://schemas.microsoft.com/office/powerpoint/2010/main" val="136113324"/>
       </p:ext>
     </p:extLst>
   </p:cSld>
@@ -6021,7 +7094,7 @@
       </p:grpSpPr>
       <p:sp>
         <p:nvSpPr>
-          <p:cNvPr id="219" name="Purpose"/>
+          <p:cNvPr id="194" name="Introduction"/>
           <p:cNvSpPr txBox="1">
             <a:spLocks noGrp="1"/>
           </p:cNvSpPr>
@@ -6046,7 +7119,7 @@
           <a:p>
             <a:r>
               <a:rPr lang="en-US" dirty="0"/>
-              <a:t>Results</a:t>
+              <a:t>Experimental Setup</a:t>
             </a:r>
             <a:endParaRPr dirty="0"/>
           </a:p>
@@ -6054,7 +7127,7 @@
       </p:sp>
       <p:sp>
         <p:nvSpPr>
-          <p:cNvPr id="220" name="New digital posters offer:…"/>
+          <p:cNvPr id="195" name="Welcome to the 2024 ISMRM in Singapore!…"/>
           <p:cNvSpPr txBox="1">
             <a:spLocks noGrp="1"/>
           </p:cNvSpPr>
@@ -6063,10 +7136,6 @@
           </p:nvPr>
         </p:nvSpPr>
         <p:spPr>
-          <a:xfrm>
-            <a:off x="157075" y="920213"/>
-            <a:ext cx="8800501" cy="3706106"/>
-          </a:xfrm>
           <a:prstGeom prst="rect">
             <a:avLst/>
           </a:prstGeom>
@@ -6077,63 +7146,25 @@
           </a:bodyPr>
           <a:lstStyle/>
           <a:p>
-            <a:pPr marL="0" indent="0" defTabSz="685800">
-              <a:buSzTx/>
-              <a:buNone/>
-              <a:defRPr sz="2100"/>
+            <a:pPr marL="420623" indent="-373888" defTabSz="841247">
+              <a:buSzPts val="2500"/>
+              <a:defRPr sz="2576"/>
             </a:pPr>
             <a:r>
               <a:rPr lang="en-US" dirty="0"/>
-              <a:t>Text here</a:t>
-            </a:r>
-            <a:r>
-              <a:rPr dirty="0"/>
-              <a:t>:</a:t>
-            </a:r>
-          </a:p>
-          <a:p>
-            <a:pPr marL="342900" indent="-304800" defTabSz="685800">
-              <a:buSzPts val="2100"/>
-              <a:defRPr sz="2100"/>
+              <a:t>Text</a:t>
+            </a:r>
+            <a:endParaRPr dirty="0"/>
+          </a:p>
+          <a:p>
+            <a:pPr marL="864616" lvl="1" indent="-373888" defTabSz="841247">
+              <a:buSzPts val="2500"/>
+              <a:buChar char="●"/>
+              <a:defRPr sz="2576"/>
             </a:pPr>
             <a:r>
-              <a:rPr lang="en-US" b="1" dirty="0"/>
+              <a:rPr lang="en-US" dirty="0"/>
               <a:t>Subtext</a:t>
-            </a:r>
-            <a:endParaRPr dirty="0"/>
-          </a:p>
-          <a:p>
-            <a:pPr marL="704850" lvl="1" indent="-304800" defTabSz="685800">
-              <a:buSzPts val="2100"/>
-              <a:buChar char="●"/>
-              <a:defRPr sz="2100"/>
-            </a:pPr>
-            <a:r>
-              <a:rPr lang="en-US" dirty="0"/>
-              <a:t>Other Text</a:t>
-            </a:r>
-            <a:endParaRPr dirty="0"/>
-          </a:p>
-          <a:p>
-            <a:pPr marL="342900" indent="-304800" defTabSz="685800">
-              <a:buSzPts val="2100"/>
-              <a:defRPr sz="2100"/>
-            </a:pPr>
-            <a:r>
-              <a:rPr lang="en-US" b="1" dirty="0"/>
-              <a:t>Subtext</a:t>
-            </a:r>
-            <a:endParaRPr dirty="0"/>
-          </a:p>
-          <a:p>
-            <a:pPr marL="704850" lvl="1" indent="-304800" defTabSz="685800">
-              <a:buSzPts val="2100"/>
-              <a:buChar char="●"/>
-              <a:defRPr sz="2100"/>
-            </a:pPr>
-            <a:r>
-              <a:rPr lang="en-US" dirty="0"/>
-              <a:t>Other Text</a:t>
             </a:r>
             <a:endParaRPr dirty="0"/>
           </a:p>
@@ -6142,7 +7173,7 @@
     </p:spTree>
     <p:extLst>
       <p:ext uri="{BB962C8B-B14F-4D97-AF65-F5344CB8AC3E}">
-        <p14:creationId xmlns:p14="http://schemas.microsoft.com/office/powerpoint/2010/main" val="1708040328"/>
+        <p14:creationId xmlns:p14="http://schemas.microsoft.com/office/powerpoint/2010/main" val="2715737814"/>
       </p:ext>
     </p:extLst>
   </p:cSld>
@@ -6172,7 +7203,7 @@
       </p:grpSpPr>
       <p:sp>
         <p:nvSpPr>
-          <p:cNvPr id="194" name="Introduction"/>
+          <p:cNvPr id="219" name="Purpose"/>
           <p:cNvSpPr txBox="1">
             <a:spLocks noGrp="1"/>
           </p:cNvSpPr>
@@ -6197,7 +7228,7 @@
           <a:p>
             <a:r>
               <a:rPr lang="en-US" dirty="0"/>
-              <a:t>Discussion</a:t>
+              <a:t>Results</a:t>
             </a:r>
             <a:endParaRPr dirty="0"/>
           </a:p>
@@ -6205,7 +7236,7 @@
       </p:sp>
       <p:sp>
         <p:nvSpPr>
-          <p:cNvPr id="195" name="Welcome to the 2024 ISMRM in Singapore!…"/>
+          <p:cNvPr id="220" name="New digital posters offer:…"/>
           <p:cNvSpPr txBox="1">
             <a:spLocks noGrp="1"/>
           </p:cNvSpPr>
@@ -6214,6 +7245,10 @@
           </p:nvPr>
         </p:nvSpPr>
         <p:spPr>
+          <a:xfrm>
+            <a:off x="157075" y="920213"/>
+            <a:ext cx="8800501" cy="3706106"/>
+          </a:xfrm>
           <a:prstGeom prst="rect">
             <a:avLst/>
           </a:prstGeom>
@@ -6224,25 +7259,63 @@
           </a:bodyPr>
           <a:lstStyle/>
           <a:p>
-            <a:pPr marL="420623" indent="-373888" defTabSz="841247">
-              <a:buSzPts val="2500"/>
-              <a:defRPr sz="2576"/>
+            <a:pPr marL="0" indent="0" defTabSz="685800">
+              <a:buSzTx/>
+              <a:buNone/>
+              <a:defRPr sz="2100"/>
             </a:pPr>
             <a:r>
               <a:rPr lang="en-US" dirty="0"/>
-              <a:t>Text</a:t>
+              <a:t>Text here</a:t>
+            </a:r>
+            <a:r>
+              <a:rPr dirty="0"/>
+              <a:t>:</a:t>
+            </a:r>
+          </a:p>
+          <a:p>
+            <a:pPr marL="342900" indent="-304800" defTabSz="685800">
+              <a:buSzPts val="2100"/>
+              <a:defRPr sz="2100"/>
+            </a:pPr>
+            <a:r>
+              <a:rPr lang="en-US" b="1" dirty="0"/>
+              <a:t>Subtext</a:t>
             </a:r>
             <a:endParaRPr dirty="0"/>
           </a:p>
           <a:p>
-            <a:pPr marL="864616" lvl="1" indent="-373888" defTabSz="841247">
-              <a:buSzPts val="2500"/>
+            <a:pPr marL="704850" lvl="1" indent="-304800" defTabSz="685800">
+              <a:buSzPts val="2100"/>
               <a:buChar char="●"/>
-              <a:defRPr sz="2576"/>
+              <a:defRPr sz="2100"/>
             </a:pPr>
             <a:r>
               <a:rPr lang="en-US" dirty="0"/>
+              <a:t>Other Text</a:t>
+            </a:r>
+            <a:endParaRPr dirty="0"/>
+          </a:p>
+          <a:p>
+            <a:pPr marL="342900" indent="-304800" defTabSz="685800">
+              <a:buSzPts val="2100"/>
+              <a:defRPr sz="2100"/>
+            </a:pPr>
+            <a:r>
+              <a:rPr lang="en-US" b="1" dirty="0"/>
               <a:t>Subtext</a:t>
+            </a:r>
+            <a:endParaRPr dirty="0"/>
+          </a:p>
+          <a:p>
+            <a:pPr marL="704850" lvl="1" indent="-304800" defTabSz="685800">
+              <a:buSzPts val="2100"/>
+              <a:buChar char="●"/>
+              <a:defRPr sz="2100"/>
+            </a:pPr>
+            <a:r>
+              <a:rPr lang="en-US" dirty="0"/>
+              <a:t>Other Text</a:t>
             </a:r>
             <a:endParaRPr dirty="0"/>
           </a:p>
@@ -6251,7 +7324,7 @@
     </p:spTree>
     <p:extLst>
       <p:ext uri="{BB962C8B-B14F-4D97-AF65-F5344CB8AC3E}">
-        <p14:creationId xmlns:p14="http://schemas.microsoft.com/office/powerpoint/2010/main" val="1561782918"/>
+        <p14:creationId xmlns:p14="http://schemas.microsoft.com/office/powerpoint/2010/main" val="1708040328"/>
       </p:ext>
     </p:extLst>
   </p:cSld>
@@ -6281,7 +7354,7 @@
       </p:grpSpPr>
       <p:sp>
         <p:nvSpPr>
-          <p:cNvPr id="219" name="Purpose"/>
+          <p:cNvPr id="194" name="Introduction"/>
           <p:cNvSpPr txBox="1">
             <a:spLocks noGrp="1"/>
           </p:cNvSpPr>
@@ -6306,7 +7379,7 @@
           <a:p>
             <a:r>
               <a:rPr lang="en-US" dirty="0"/>
-              <a:t>Impact</a:t>
+              <a:t>Discussion</a:t>
             </a:r>
             <a:endParaRPr dirty="0"/>
           </a:p>
@@ -6314,7 +7387,7 @@
       </p:sp>
       <p:sp>
         <p:nvSpPr>
-          <p:cNvPr id="220" name="New digital posters offer:…"/>
+          <p:cNvPr id="195" name="Welcome to the 2024 ISMRM in Singapore!…"/>
           <p:cNvSpPr txBox="1">
             <a:spLocks noGrp="1"/>
           </p:cNvSpPr>
@@ -6323,10 +7396,6 @@
           </p:nvPr>
         </p:nvSpPr>
         <p:spPr>
-          <a:xfrm>
-            <a:off x="157075" y="920213"/>
-            <a:ext cx="8800501" cy="3706106"/>
-          </a:xfrm>
           <a:prstGeom prst="rect">
             <a:avLst/>
           </a:prstGeom>
@@ -6337,63 +7406,25 @@
           </a:bodyPr>
           <a:lstStyle/>
           <a:p>
-            <a:pPr marL="0" indent="0" defTabSz="685800">
-              <a:buSzTx/>
-              <a:buNone/>
-              <a:defRPr sz="2100"/>
+            <a:pPr marL="420623" indent="-373888" defTabSz="841247">
+              <a:buSzPts val="2500"/>
+              <a:defRPr sz="2576"/>
             </a:pPr>
             <a:r>
               <a:rPr lang="en-US" dirty="0"/>
-              <a:t>Text here</a:t>
-            </a:r>
-            <a:r>
-              <a:rPr dirty="0"/>
-              <a:t>:</a:t>
-            </a:r>
-          </a:p>
-          <a:p>
-            <a:pPr marL="342900" indent="-304800" defTabSz="685800">
-              <a:buSzPts val="2100"/>
-              <a:defRPr sz="2100"/>
+              <a:t>Text</a:t>
+            </a:r>
+            <a:endParaRPr dirty="0"/>
+          </a:p>
+          <a:p>
+            <a:pPr marL="864616" lvl="1" indent="-373888" defTabSz="841247">
+              <a:buSzPts val="2500"/>
+              <a:buChar char="●"/>
+              <a:defRPr sz="2576"/>
             </a:pPr>
             <a:r>
-              <a:rPr lang="en-US" b="1" dirty="0"/>
+              <a:rPr lang="en-US" dirty="0"/>
               <a:t>Subtext</a:t>
-            </a:r>
-            <a:endParaRPr dirty="0"/>
-          </a:p>
-          <a:p>
-            <a:pPr marL="704850" lvl="1" indent="-304800" defTabSz="685800">
-              <a:buSzPts val="2100"/>
-              <a:buChar char="●"/>
-              <a:defRPr sz="2100"/>
-            </a:pPr>
-            <a:r>
-              <a:rPr lang="en-US" dirty="0"/>
-              <a:t>Other Text</a:t>
-            </a:r>
-            <a:endParaRPr dirty="0"/>
-          </a:p>
-          <a:p>
-            <a:pPr marL="342900" indent="-304800" defTabSz="685800">
-              <a:buSzPts val="2100"/>
-              <a:defRPr sz="2100"/>
-            </a:pPr>
-            <a:r>
-              <a:rPr lang="en-US" b="1" dirty="0"/>
-              <a:t>Subtext</a:t>
-            </a:r>
-            <a:endParaRPr dirty="0"/>
-          </a:p>
-          <a:p>
-            <a:pPr marL="704850" lvl="1" indent="-304800" defTabSz="685800">
-              <a:buSzPts val="2100"/>
-              <a:buChar char="●"/>
-              <a:defRPr sz="2100"/>
-            </a:pPr>
-            <a:r>
-              <a:rPr lang="en-US" dirty="0"/>
-              <a:t>Other Text</a:t>
             </a:r>
             <a:endParaRPr dirty="0"/>
           </a:p>
@@ -6402,7 +7433,7 @@
     </p:spTree>
     <p:extLst>
       <p:ext uri="{BB962C8B-B14F-4D97-AF65-F5344CB8AC3E}">
-        <p14:creationId xmlns:p14="http://schemas.microsoft.com/office/powerpoint/2010/main" val="3613813544"/>
+        <p14:creationId xmlns:p14="http://schemas.microsoft.com/office/powerpoint/2010/main" val="1561782918"/>
       </p:ext>
     </p:extLst>
   </p:cSld>
@@ -6432,6 +7463,157 @@
       </p:grpSpPr>
       <p:sp>
         <p:nvSpPr>
+          <p:cNvPr id="219" name="Purpose"/>
+          <p:cNvSpPr txBox="1">
+            <a:spLocks noGrp="1"/>
+          </p:cNvSpPr>
+          <p:nvPr>
+            <p:ph type="title"/>
+          </p:nvPr>
+        </p:nvSpPr>
+        <p:spPr>
+          <a:prstGeom prst="rect">
+            <a:avLst/>
+          </a:prstGeom>
+        </p:spPr>
+        <p:txBody>
+          <a:bodyPr>
+            <a:normAutofit fontScale="90000"/>
+          </a:bodyPr>
+          <a:lstStyle>
+            <a:lvl1pPr defTabSz="804672">
+              <a:defRPr sz="4224"/>
+            </a:lvl1pPr>
+          </a:lstStyle>
+          <a:p>
+            <a:r>
+              <a:rPr lang="en-US" dirty="0"/>
+              <a:t>Impact</a:t>
+            </a:r>
+            <a:endParaRPr dirty="0"/>
+          </a:p>
+        </p:txBody>
+      </p:sp>
+      <p:sp>
+        <p:nvSpPr>
+          <p:cNvPr id="220" name="New digital posters offer:…"/>
+          <p:cNvSpPr txBox="1">
+            <a:spLocks noGrp="1"/>
+          </p:cNvSpPr>
+          <p:nvPr>
+            <p:ph type="body" idx="1"/>
+          </p:nvPr>
+        </p:nvSpPr>
+        <p:spPr>
+          <a:xfrm>
+            <a:off x="157075" y="920213"/>
+            <a:ext cx="8800501" cy="3706106"/>
+          </a:xfrm>
+          <a:prstGeom prst="rect">
+            <a:avLst/>
+          </a:prstGeom>
+        </p:spPr>
+        <p:txBody>
+          <a:bodyPr>
+            <a:normAutofit/>
+          </a:bodyPr>
+          <a:lstStyle/>
+          <a:p>
+            <a:pPr marL="0" indent="0" defTabSz="685800">
+              <a:buSzTx/>
+              <a:buNone/>
+              <a:defRPr sz="2100"/>
+            </a:pPr>
+            <a:r>
+              <a:rPr lang="en-US" dirty="0"/>
+              <a:t>Text here</a:t>
+            </a:r>
+            <a:r>
+              <a:rPr dirty="0"/>
+              <a:t>:</a:t>
+            </a:r>
+          </a:p>
+          <a:p>
+            <a:pPr marL="342900" indent="-304800" defTabSz="685800">
+              <a:buSzPts val="2100"/>
+              <a:defRPr sz="2100"/>
+            </a:pPr>
+            <a:r>
+              <a:rPr lang="en-US" b="1" dirty="0"/>
+              <a:t>Subtext</a:t>
+            </a:r>
+            <a:endParaRPr dirty="0"/>
+          </a:p>
+          <a:p>
+            <a:pPr marL="704850" lvl="1" indent="-304800" defTabSz="685800">
+              <a:buSzPts val="2100"/>
+              <a:buChar char="●"/>
+              <a:defRPr sz="2100"/>
+            </a:pPr>
+            <a:r>
+              <a:rPr lang="en-US" dirty="0"/>
+              <a:t>Other Text</a:t>
+            </a:r>
+            <a:endParaRPr dirty="0"/>
+          </a:p>
+          <a:p>
+            <a:pPr marL="342900" indent="-304800" defTabSz="685800">
+              <a:buSzPts val="2100"/>
+              <a:defRPr sz="2100"/>
+            </a:pPr>
+            <a:r>
+              <a:rPr lang="en-US" b="1" dirty="0"/>
+              <a:t>Subtext</a:t>
+            </a:r>
+            <a:endParaRPr dirty="0"/>
+          </a:p>
+          <a:p>
+            <a:pPr marL="704850" lvl="1" indent="-304800" defTabSz="685800">
+              <a:buSzPts val="2100"/>
+              <a:buChar char="●"/>
+              <a:defRPr sz="2100"/>
+            </a:pPr>
+            <a:r>
+              <a:rPr lang="en-US" dirty="0"/>
+              <a:t>Other Text</a:t>
+            </a:r>
+            <a:endParaRPr dirty="0"/>
+          </a:p>
+        </p:txBody>
+      </p:sp>
+    </p:spTree>
+    <p:extLst>
+      <p:ext uri="{BB962C8B-B14F-4D97-AF65-F5344CB8AC3E}">
+        <p14:creationId xmlns:p14="http://schemas.microsoft.com/office/powerpoint/2010/main" val="3613813544"/>
+      </p:ext>
+    </p:extLst>
+  </p:cSld>
+  <p:clrMapOvr>
+    <a:masterClrMapping/>
+  </p:clrMapOvr>
+  <p:transition spd="med"/>
+</p:sld>
+</file>
+
+<file path=ppt/slides/slide15.xml><?xml version="1.0" encoding="utf-8"?>
+<p:sld xmlns:a="http://schemas.openxmlformats.org/drawingml/2006/main" xmlns:r="http://schemas.openxmlformats.org/officeDocument/2006/relationships" xmlns:p="http://schemas.openxmlformats.org/presentationml/2006/main">
+  <p:cSld>
+    <p:spTree>
+      <p:nvGrpSpPr>
+        <p:cNvPr id="1" name=""/>
+        <p:cNvGrpSpPr/>
+        <p:nvPr/>
+      </p:nvGrpSpPr>
+      <p:grpSpPr>
+        <a:xfrm>
+          <a:off x="0" y="0"/>
+          <a:ext cx="0" cy="0"/>
+          <a:chOff x="0" y="0"/>
+          <a:chExt cx="0" cy="0"/>
+        </a:xfrm>
+      </p:grpSpPr>
+      <p:sp>
+        <p:nvSpPr>
           <p:cNvPr id="194" name="Introduction"/>
           <p:cNvSpPr txBox="1">
             <a:spLocks noGrp="1"/>
@@ -6523,6 +7705,379 @@
 </file>
 
 <file path=ppt/slides/slide2.xml><?xml version="1.0" encoding="utf-8"?>
+<p:sld xmlns:a="http://schemas.openxmlformats.org/drawingml/2006/main" xmlns:r="http://schemas.openxmlformats.org/officeDocument/2006/relationships" xmlns:p="http://schemas.openxmlformats.org/presentationml/2006/main">
+  <p:cSld>
+    <p:spTree>
+      <p:nvGrpSpPr>
+        <p:cNvPr id="1" name=""/>
+        <p:cNvGrpSpPr/>
+        <p:nvPr/>
+      </p:nvGrpSpPr>
+      <p:grpSpPr>
+        <a:xfrm>
+          <a:off x="0" y="0"/>
+          <a:ext cx="0" cy="0"/>
+          <a:chOff x="0" y="0"/>
+          <a:chExt cx="0" cy="0"/>
+        </a:xfrm>
+      </p:grpSpPr>
+      <p:sp>
+        <p:nvSpPr>
+          <p:cNvPr id="2" name="Titel 1"/>
+          <p:cNvSpPr>
+            <a:spLocks noGrp="1"/>
+          </p:cNvSpPr>
+          <p:nvPr>
+            <p:ph type="ctrTitle"/>
+          </p:nvPr>
+        </p:nvSpPr>
+        <p:spPr>
+          <a:xfrm>
+            <a:off x="3131840" y="975360"/>
+            <a:ext cx="5760640" cy="1630820"/>
+          </a:xfrm>
+        </p:spPr>
+        <p:txBody>
+          <a:bodyPr/>
+          <a:lstStyle/>
+          <a:p>
+            <a:r>
+              <a:rPr lang="de-DE" sz="2800" dirty="0">
+                <a:latin typeface="Arial" panose="020B0604020202020204" pitchFamily="34" charset="0"/>
+              </a:rPr>
+              <a:t>Semi-Automated Bone Tracking for Dynamic MRI Analysis of Knee Joint Kinematics</a:t>
+            </a:r>
+          </a:p>
+        </p:txBody>
+      </p:sp>
+      <p:sp>
+        <p:nvSpPr>
+          <p:cNvPr id="3" name="Untertitel 2"/>
+          <p:cNvSpPr>
+            <a:spLocks noGrp="1"/>
+          </p:cNvSpPr>
+          <p:nvPr>
+            <p:ph type="subTitle" idx="1"/>
+          </p:nvPr>
+        </p:nvSpPr>
+        <p:spPr>
+          <a:xfrm>
+            <a:off x="1877568" y="2784775"/>
+            <a:ext cx="7014911" cy="1094506"/>
+          </a:xfrm>
+        </p:spPr>
+        <p:txBody>
+          <a:bodyPr>
+            <a:normAutofit fontScale="85000" lnSpcReduction="10000"/>
+          </a:bodyPr>
+          <a:lstStyle/>
+          <a:p>
+            <a:pPr algn="ctr">
+              <a:lnSpc>
+                <a:spcPct val="100000"/>
+              </a:lnSpc>
+              <a:spcAft>
+                <a:spcPts val="1559"/>
+              </a:spcAft>
+              <a:buNone/>
+            </a:pPr>
+            <a:r>
+              <a:rPr lang="de-DE" sz="2400" b="0" strike="noStrike" spc="-1" dirty="0">
+                <a:solidFill>
+                  <a:srgbClr val="0056A2"/>
+                </a:solidFill>
+                <a:latin typeface="Fira Sans"/>
+                <a:ea typeface="Fira Sans"/>
+              </a:rPr>
+              <a:t>Aayush Nepal</a:t>
+            </a:r>
+            <a:r>
+              <a:rPr lang="de-DE" sz="2400" b="0" strike="noStrike" spc="-1" baseline="30000" dirty="0">
+                <a:solidFill>
+                  <a:srgbClr val="0056A2"/>
+                </a:solidFill>
+                <a:latin typeface="Fira Sans"/>
+                <a:ea typeface="Fira Sans"/>
+              </a:rPr>
+              <a:t>1</a:t>
+            </a:r>
+            <a:r>
+              <a:rPr lang="de-DE" sz="2400" b="0" strike="noStrike" spc="-1" dirty="0">
+                <a:solidFill>
+                  <a:srgbClr val="0056A2"/>
+                </a:solidFill>
+                <a:latin typeface="Fira Sans"/>
+                <a:ea typeface="Fira Sans"/>
+              </a:rPr>
+              <a:t>, Nicholas M. Brisson</a:t>
+            </a:r>
+            <a:r>
+              <a:rPr lang="de-DE" sz="2400" b="0" strike="noStrike" spc="-1" baseline="30000" dirty="0">
+                <a:solidFill>
+                  <a:srgbClr val="0056A2"/>
+                </a:solidFill>
+                <a:latin typeface="Fira Sans"/>
+                <a:ea typeface="Fira Sans"/>
+              </a:rPr>
+              <a:t>2</a:t>
+            </a:r>
+            <a:r>
+              <a:rPr lang="de-DE" sz="2400" b="0" strike="noStrike" spc="-1" dirty="0">
+                <a:solidFill>
+                  <a:srgbClr val="0056A2"/>
+                </a:solidFill>
+                <a:latin typeface="Fira Sans"/>
+                <a:ea typeface="Fira Sans"/>
+              </a:rPr>
+              <a:t>, Georg N. Duda</a:t>
+            </a:r>
+            <a:r>
+              <a:rPr lang="de-DE" sz="2400" b="0" strike="noStrike" spc="-1" baseline="30000" dirty="0">
+                <a:solidFill>
+                  <a:srgbClr val="0056A2"/>
+                </a:solidFill>
+                <a:latin typeface="Fira Sans"/>
+                <a:ea typeface="Fira Sans"/>
+              </a:rPr>
+              <a:t>2</a:t>
+            </a:r>
+            <a:r>
+              <a:rPr lang="de-DE" sz="2400" b="0" strike="noStrike" spc="-1" dirty="0">
+                <a:solidFill>
+                  <a:srgbClr val="0056A2"/>
+                </a:solidFill>
+                <a:latin typeface="Fira Sans"/>
+                <a:ea typeface="Fira Sans"/>
+              </a:rPr>
+              <a:t>,  </a:t>
+            </a:r>
+            <a:endParaRPr lang="en-US" sz="2400" b="0" strike="noStrike" spc="-1" dirty="0">
+              <a:latin typeface="Arial"/>
+            </a:endParaRPr>
+          </a:p>
+          <a:p>
+            <a:pPr algn="ctr">
+              <a:lnSpc>
+                <a:spcPct val="100000"/>
+              </a:lnSpc>
+              <a:spcAft>
+                <a:spcPts val="1559"/>
+              </a:spcAft>
+              <a:buNone/>
+            </a:pPr>
+            <a:r>
+              <a:rPr lang="de-DE" sz="2400" b="0" strike="noStrike" spc="-1" dirty="0">
+                <a:solidFill>
+                  <a:srgbClr val="0056A2"/>
+                </a:solidFill>
+                <a:latin typeface="Fira Sans"/>
+                <a:ea typeface="Fira Sans"/>
+              </a:rPr>
+              <a:t>Felix Güttler</a:t>
+            </a:r>
+            <a:r>
+              <a:rPr lang="de-DE" spc="-1" baseline="30000" dirty="0">
+                <a:solidFill>
+                  <a:srgbClr val="0056A2"/>
+                </a:solidFill>
+                <a:latin typeface="Fira Sans"/>
+                <a:ea typeface="Fira Sans"/>
+              </a:rPr>
+              <a:t>3</a:t>
+            </a:r>
+            <a:r>
+              <a:rPr lang="de-DE" spc="-1" dirty="0">
+                <a:solidFill>
+                  <a:srgbClr val="0056A2"/>
+                </a:solidFill>
+                <a:latin typeface="Fira Sans"/>
+                <a:ea typeface="Fira Sans"/>
+              </a:rPr>
+              <a:t>,</a:t>
+            </a:r>
+            <a:r>
+              <a:rPr lang="de-DE" spc="-1" baseline="30000" dirty="0">
+                <a:solidFill>
+                  <a:srgbClr val="0056A2"/>
+                </a:solidFill>
+                <a:latin typeface="Fira Sans"/>
+                <a:ea typeface="Fira Sans"/>
+              </a:rPr>
+              <a:t> </a:t>
+            </a:r>
+            <a:r>
+              <a:rPr lang="de-DE" spc="-1" dirty="0">
+                <a:solidFill>
+                  <a:srgbClr val="0056A2"/>
+                </a:solidFill>
+                <a:latin typeface="Fira Sans"/>
+                <a:ea typeface="Fira Sans"/>
+              </a:rPr>
+              <a:t>J</a:t>
+            </a:r>
+            <a:r>
+              <a:rPr lang="de-DE" sz="2400" b="0" strike="noStrike" spc="-1" dirty="0">
+                <a:solidFill>
+                  <a:srgbClr val="0056A2"/>
+                </a:solidFill>
+                <a:latin typeface="Fira Sans"/>
+                <a:ea typeface="Fira Sans"/>
+              </a:rPr>
+              <a:t>ürgen R. Reichenbach</a:t>
+            </a:r>
+            <a:r>
+              <a:rPr lang="de-DE" sz="2400" b="0" strike="noStrike" spc="-1" baseline="30000" dirty="0">
+                <a:solidFill>
+                  <a:srgbClr val="0056A2"/>
+                </a:solidFill>
+                <a:latin typeface="Fira Sans"/>
+                <a:ea typeface="Fira Sans"/>
+              </a:rPr>
+              <a:t>1</a:t>
+            </a:r>
+            <a:r>
+              <a:rPr lang="de-DE" sz="2400" b="0" strike="noStrike" spc="-1" dirty="0">
+                <a:solidFill>
+                  <a:srgbClr val="0056A2"/>
+                </a:solidFill>
+                <a:latin typeface="Fira Sans"/>
+                <a:ea typeface="Fira Sans"/>
+              </a:rPr>
+              <a:t>,</a:t>
+            </a:r>
+            <a:r>
+              <a:rPr lang="de-DE" sz="2400" b="0" strike="noStrike" spc="-1" baseline="30000" dirty="0">
+                <a:solidFill>
+                  <a:srgbClr val="0056A2"/>
+                </a:solidFill>
+                <a:latin typeface="Fira Sans"/>
+                <a:ea typeface="Fira Sans"/>
+              </a:rPr>
+              <a:t> </a:t>
+            </a:r>
+            <a:r>
+              <a:rPr lang="de-DE" sz="2400" b="0" strike="noStrike" spc="-1" dirty="0">
+                <a:solidFill>
+                  <a:srgbClr val="0056A2"/>
+                </a:solidFill>
+                <a:latin typeface="Fira Sans"/>
+                <a:ea typeface="Fira Sans"/>
+              </a:rPr>
+              <a:t>and Martin Krämer</a:t>
+            </a:r>
+            <a:r>
+              <a:rPr lang="de-DE" sz="2400" b="0" strike="noStrike" spc="-1" baseline="30000" dirty="0">
+                <a:solidFill>
+                  <a:srgbClr val="0056A2"/>
+                </a:solidFill>
+                <a:latin typeface="Fira Sans"/>
+                <a:ea typeface="Fira Sans"/>
+              </a:rPr>
+              <a:t>1</a:t>
+            </a:r>
+            <a:r>
+              <a:rPr lang="de-DE" sz="2400" b="0" strike="noStrike" spc="-1" dirty="0">
+                <a:solidFill>
+                  <a:srgbClr val="0056A2"/>
+                </a:solidFill>
+                <a:latin typeface="Fira Sans"/>
+                <a:ea typeface="Fira Sans"/>
+              </a:rPr>
+              <a:t> </a:t>
+            </a:r>
+          </a:p>
+          <a:p>
+            <a:endParaRPr lang="de-DE" dirty="0">
+              <a:latin typeface="Arial" panose="020B0604020202020204" pitchFamily="34" charset="0"/>
+            </a:endParaRPr>
+          </a:p>
+        </p:txBody>
+      </p:sp>
+      <p:sp>
+        <p:nvSpPr>
+          <p:cNvPr id="4" name="Textplatzhalter 3"/>
+          <p:cNvSpPr>
+            <a:spLocks noGrp="1"/>
+          </p:cNvSpPr>
+          <p:nvPr>
+            <p:ph type="body" sz="quarter" idx="14"/>
+          </p:nvPr>
+        </p:nvSpPr>
+        <p:spPr>
+          <a:xfrm>
+            <a:off x="243840" y="4108704"/>
+            <a:ext cx="8648640" cy="938784"/>
+          </a:xfrm>
+        </p:spPr>
+        <p:txBody>
+          <a:bodyPr>
+            <a:normAutofit fontScale="85000" lnSpcReduction="20000"/>
+          </a:bodyPr>
+          <a:lstStyle/>
+          <a:p>
+            <a:r>
+              <a:rPr lang="de-DE" baseline="30000" dirty="0">
+                <a:latin typeface="Arial" panose="020B0604020202020204" pitchFamily="34" charset="0"/>
+              </a:rPr>
+              <a:t>1</a:t>
+            </a:r>
+            <a:r>
+              <a:rPr lang="de-DE" dirty="0">
+                <a:latin typeface="Arial" panose="020B0604020202020204" pitchFamily="34" charset="0"/>
+              </a:rPr>
+              <a:t>Medical Physics Group, Institute of Diagnostic and Interventional Radiology, Jena University Hospital - Friedrich Schiller University Jena, Jena, Germany, </a:t>
+            </a:r>
+          </a:p>
+          <a:p>
+            <a:r>
+              <a:rPr lang="de-DE" baseline="30000" dirty="0">
+                <a:latin typeface="Arial" panose="020B0604020202020204" pitchFamily="34" charset="0"/>
+              </a:rPr>
+              <a:t>2</a:t>
+            </a:r>
+            <a:r>
+              <a:rPr lang="de-DE" dirty="0">
+                <a:latin typeface="Arial" panose="020B0604020202020204" pitchFamily="34" charset="0"/>
+              </a:rPr>
+              <a:t>Julius Wolff Institute, Berlin Institute of Health, Charité -Universitätsmedizin Berlin, Berlin, Germany, </a:t>
+            </a:r>
+          </a:p>
+          <a:p>
+            <a:r>
+              <a:rPr lang="de-DE" baseline="30000" dirty="0"/>
+              <a:t>3</a:t>
+            </a:r>
+            <a:r>
+              <a:rPr lang="de-DE" dirty="0">
+                <a:latin typeface="Arial" panose="020B0604020202020204" pitchFamily="34" charset="0"/>
+              </a:rPr>
+              <a:t>Institute of Diagnostic and Interventional Radiology, Jena University Hospital - Friedrich Schiller University Jena, Jena, Germany</a:t>
+            </a:r>
+          </a:p>
+        </p:txBody>
+      </p:sp>
+    </p:spTree>
+    <p:extLst>
+      <p:ext uri="{BB962C8B-B14F-4D97-AF65-F5344CB8AC3E}">
+        <p14:creationId xmlns:p14="http://schemas.microsoft.com/office/powerpoint/2010/main" val="3647533617"/>
+      </p:ext>
+    </p:extLst>
+  </p:cSld>
+  <p:clrMapOvr>
+    <a:masterClrMapping/>
+  </p:clrMapOvr>
+  <mc:AlternateContent xmlns:mc="http://schemas.openxmlformats.org/markup-compatibility/2006">
+    <mc:Choice xmlns:p14="http://schemas.microsoft.com/office/powerpoint/2010/main" Requires="p14">
+      <p:transition spd="slow" p14:dur="2000" advTm="7405"/>
+    </mc:Choice>
+    <mc:Fallback>
+      <p:transition spd="slow" advTm="7405"/>
+    </mc:Fallback>
+  </mc:AlternateContent>
+</p:sld>
+</file>
+
+<file path=ppt/slides/slide3.xml><?xml version="1.0" encoding="utf-8"?>
 <p:sld xmlns:a="http://schemas.openxmlformats.org/drawingml/2006/main" xmlns:r="http://schemas.openxmlformats.org/officeDocument/2006/relationships" xmlns:p="http://schemas.openxmlformats.org/presentationml/2006/main">
   <p:cSld>
     <p:spTree>
@@ -6787,7 +8342,7 @@
               <a:t> Digital Poster </a:t>
             </a:r>
             <a:r>
-              <a:rPr lang="en-US" sz="4000" dirty="0" smtClean="0"/>
+              <a:rPr lang="en-US" sz="4000" dirty="0"/>
               <a:t>at the Meeting</a:t>
             </a:r>
             <a:endParaRPr sz="4000" dirty="0"/>
@@ -6813,7 +8368,7 @@
           </a:ln>
           <a:extLst>
             <a:ext uri="{C572A759-6A51-4108-AA02-DFA0A04FC94B}">
-              <ma14:wrappingTextBoxFlag xmlns="" xmlns:m="http://schemas.openxmlformats.org/officeDocument/2006/math" xmlns:a14="http://schemas.microsoft.com/office/drawing/2010/main" xmlns:ma14="http://schemas.microsoft.com/office/mac/drawingml/2011/main" val="1"/>
+              <ma14:wrappingTextBoxFlag xmlns:ma14="http://schemas.microsoft.com/office/mac/drawingml/2011/main" xmlns:a14="http://schemas.microsoft.com/office/drawing/2010/main" xmlns:m="http://schemas.openxmlformats.org/officeDocument/2006/math" xmlns="" val="1"/>
             </a:ext>
           </a:extLst>
         </p:spPr>
@@ -6869,7 +8424,7 @@
           </a:ln>
           <a:extLst>
             <a:ext uri="{C572A759-6A51-4108-AA02-DFA0A04FC94B}">
-              <ma14:wrappingTextBoxFlag xmlns="" xmlns:m="http://schemas.openxmlformats.org/officeDocument/2006/math" xmlns:a14="http://schemas.microsoft.com/office/drawing/2010/main" xmlns:ma14="http://schemas.microsoft.com/office/mac/drawingml/2011/main" val="1"/>
+              <ma14:wrappingTextBoxFlag xmlns:ma14="http://schemas.microsoft.com/office/mac/drawingml/2011/main" xmlns:a14="http://schemas.microsoft.com/office/drawing/2010/main" xmlns:m="http://schemas.openxmlformats.org/officeDocument/2006/math" xmlns="" val="1"/>
             </a:ext>
           </a:extLst>
         </p:spPr>
@@ -6884,12 +8439,8 @@
           </a:lstStyle>
           <a:p>
             <a:r>
-              <a:rPr lang="en-US" dirty="0" smtClean="0"/>
-              <a:t>First Author </a:t>
-            </a:r>
-            <a:r>
               <a:rPr lang="en-US" dirty="0"/>
-              <a:t>Name</a:t>
+              <a:t>First Author Name</a:t>
             </a:r>
             <a:r>
               <a:rPr lang="en-US" baseline="30000" dirty="0"/>
@@ -6897,26 +8448,18 @@
             </a:r>
             <a:r>
               <a:rPr lang="en-US" dirty="0"/>
-              <a:t>, </a:t>
-            </a:r>
-            <a:r>
-              <a:rPr lang="en-US" dirty="0" smtClean="0"/>
-              <a:t>Second Author</a:t>
-            </a:r>
-            <a:r>
-              <a:rPr lang="en-US" baseline="30000" dirty="0" smtClean="0"/>
+              <a:t>, Second Author</a:t>
+            </a:r>
+            <a:r>
+              <a:rPr lang="en-US" baseline="30000" dirty="0"/>
               <a:t>2</a:t>
             </a:r>
             <a:r>
               <a:rPr lang="en-US" dirty="0"/>
-              <a:t>, Author </a:t>
-            </a:r>
-            <a:r>
-              <a:rPr lang="en-US" dirty="0" smtClean="0"/>
-              <a:t>N. Three</a:t>
-            </a:r>
-            <a:r>
-              <a:rPr lang="en-US" baseline="30000" dirty="0" smtClean="0"/>
+              <a:t>, Author N. Three</a:t>
+            </a:r>
+            <a:r>
+              <a:rPr lang="en-US" baseline="30000" dirty="0"/>
               <a:t>1,2</a:t>
             </a:r>
             <a:endParaRPr baseline="30000" dirty="0"/>
@@ -7039,7 +8582,7 @@
 </p:sld>
 </file>
 
-<file path=ppt/slides/slide3.xml><?xml version="1.0" encoding="utf-8"?>
+<file path=ppt/slides/slide4.xml><?xml version="1.0" encoding="utf-8"?>
 <p:sld xmlns:a="http://schemas.openxmlformats.org/drawingml/2006/main" xmlns:r="http://schemas.openxmlformats.org/officeDocument/2006/relationships" xmlns:p="http://schemas.openxmlformats.org/presentationml/2006/main">
   <p:cSld>
     <p:spTree>
@@ -7350,14 +8893,9 @@
           <a:p>
             <a:pPr algn="ctr"/>
             <a:r>
-              <a:rPr lang="en-US" i="1" dirty="0" smtClean="0"/>
-              <a:t>Get this year’s declaration slides at https</a:t>
-            </a:r>
-            <a:r>
               <a:rPr lang="en-US" i="1" dirty="0"/>
-              <a:t>://www.ismrm.org/25m/guidelines/</a:t>
-            </a:r>
-            <a:endParaRPr lang="en-US" i="1" dirty="0"/>
+              <a:t>Get this year’s declaration slides at https://www.ismrm.org/25m/guidelines/</a:t>
+            </a:r>
           </a:p>
         </p:txBody>
       </p:sp>
@@ -7371,152 +8909,6 @@
   <p:clrMapOvr>
     <a:masterClrMapping/>
   </p:clrMapOvr>
-</p:sld>
-</file>
-
-<file path=ppt/slides/slide4.xml><?xml version="1.0" encoding="utf-8"?>
-<p:sld xmlns:a="http://schemas.openxmlformats.org/drawingml/2006/main" xmlns:r="http://schemas.openxmlformats.org/officeDocument/2006/relationships" xmlns:p="http://schemas.openxmlformats.org/presentationml/2006/main">
-  <p:cSld>
-    <p:spTree>
-      <p:nvGrpSpPr>
-        <p:cNvPr id="1" name=""/>
-        <p:cNvGrpSpPr/>
-        <p:nvPr/>
-      </p:nvGrpSpPr>
-      <p:grpSpPr>
-        <a:xfrm>
-          <a:off x="0" y="0"/>
-          <a:ext cx="0" cy="0"/>
-          <a:chOff x="0" y="0"/>
-          <a:chExt cx="0" cy="0"/>
-        </a:xfrm>
-      </p:grpSpPr>
-      <p:sp>
-        <p:nvSpPr>
-          <p:cNvPr id="219" name="Purpose"/>
-          <p:cNvSpPr txBox="1">
-            <a:spLocks noGrp="1"/>
-          </p:cNvSpPr>
-          <p:nvPr>
-            <p:ph type="title"/>
-          </p:nvPr>
-        </p:nvSpPr>
-        <p:spPr>
-          <a:prstGeom prst="rect">
-            <a:avLst/>
-          </a:prstGeom>
-        </p:spPr>
-        <p:txBody>
-          <a:bodyPr>
-            <a:normAutofit fontScale="90000"/>
-          </a:bodyPr>
-          <a:lstStyle>
-            <a:lvl1pPr defTabSz="804672">
-              <a:defRPr sz="4224"/>
-            </a:lvl1pPr>
-          </a:lstStyle>
-          <a:p>
-            <a:r>
-              <a:rPr lang="en-US" dirty="0"/>
-              <a:t>Motivation</a:t>
-            </a:r>
-            <a:endParaRPr dirty="0"/>
-          </a:p>
-        </p:txBody>
-      </p:sp>
-      <p:sp>
-        <p:nvSpPr>
-          <p:cNvPr id="220" name="New digital posters offer:…"/>
-          <p:cNvSpPr txBox="1">
-            <a:spLocks noGrp="1"/>
-          </p:cNvSpPr>
-          <p:nvPr>
-            <p:ph type="body" idx="1"/>
-          </p:nvPr>
-        </p:nvSpPr>
-        <p:spPr>
-          <a:xfrm>
-            <a:off x="157075" y="920213"/>
-            <a:ext cx="8800501" cy="3706106"/>
-          </a:xfrm>
-          <a:prstGeom prst="rect">
-            <a:avLst/>
-          </a:prstGeom>
-        </p:spPr>
-        <p:txBody>
-          <a:bodyPr>
-            <a:normAutofit/>
-          </a:bodyPr>
-          <a:lstStyle/>
-          <a:p>
-            <a:pPr marL="0" indent="0" defTabSz="685800">
-              <a:buSzTx/>
-              <a:buNone/>
-              <a:defRPr sz="2100"/>
-            </a:pPr>
-            <a:r>
-              <a:rPr lang="en-US" dirty="0"/>
-              <a:t>Text here</a:t>
-            </a:r>
-            <a:r>
-              <a:rPr dirty="0"/>
-              <a:t>:</a:t>
-            </a:r>
-          </a:p>
-          <a:p>
-            <a:pPr marL="342900" indent="-304800" defTabSz="685800">
-              <a:buSzPts val="2100"/>
-              <a:defRPr sz="2100"/>
-            </a:pPr>
-            <a:r>
-              <a:rPr lang="en-US" b="1" dirty="0"/>
-              <a:t>Subtext</a:t>
-            </a:r>
-            <a:endParaRPr dirty="0"/>
-          </a:p>
-          <a:p>
-            <a:pPr marL="704850" lvl="1" indent="-304800" defTabSz="685800">
-              <a:buSzPts val="2100"/>
-              <a:buChar char="●"/>
-              <a:defRPr sz="2100"/>
-            </a:pPr>
-            <a:r>
-              <a:rPr lang="en-US" dirty="0"/>
-              <a:t>Other Text</a:t>
-            </a:r>
-            <a:endParaRPr dirty="0"/>
-          </a:p>
-          <a:p>
-            <a:pPr marL="342900" indent="-304800" defTabSz="685800">
-              <a:buSzPts val="2100"/>
-              <a:defRPr sz="2100"/>
-            </a:pPr>
-            <a:r>
-              <a:rPr lang="en-US" b="1" dirty="0"/>
-              <a:t>Subtext</a:t>
-            </a:r>
-            <a:endParaRPr dirty="0"/>
-          </a:p>
-          <a:p>
-            <a:pPr marL="704850" lvl="1" indent="-304800" defTabSz="685800">
-              <a:buSzPts val="2100"/>
-              <a:buChar char="●"/>
-              <a:defRPr sz="2100"/>
-            </a:pPr>
-            <a:r>
-              <a:rPr lang="en-US" dirty="0"/>
-              <a:t>Other Text</a:t>
-            </a:r>
-            <a:endParaRPr dirty="0"/>
-          </a:p>
-        </p:txBody>
-      </p:sp>
-    </p:spTree>
-  </p:cSld>
-  <p:clrMapOvr>
-    <a:masterClrMapping/>
-  </p:clrMapOvr>
-  <p:transition spd="med"/>
 </p:sld>
 </file>
 
@@ -7539,7 +8931,7 @@
       </p:grpSpPr>
       <p:sp>
         <p:nvSpPr>
-          <p:cNvPr id="194" name="Introduction"/>
+          <p:cNvPr id="219" name="Purpose"/>
           <p:cNvSpPr txBox="1">
             <a:spLocks noGrp="1"/>
           </p:cNvSpPr>
@@ -7563,14 +8955,16 @@
           </a:lstStyle>
           <a:p>
             <a:r>
-              <a:t>Introduction</a:t>
-            </a:r>
+              <a:rPr lang="en-US" dirty="0"/>
+              <a:t>Motivation</a:t>
+            </a:r>
+            <a:endParaRPr dirty="0"/>
           </a:p>
         </p:txBody>
       </p:sp>
       <p:sp>
         <p:nvSpPr>
-          <p:cNvPr id="195" name="Welcome to the 2024 ISMRM in Singapore!…"/>
+          <p:cNvPr id="220" name="New digital posters offer:…"/>
           <p:cNvSpPr txBox="1">
             <a:spLocks noGrp="1"/>
           </p:cNvSpPr>
@@ -7579,6 +8973,10 @@
           </p:nvPr>
         </p:nvSpPr>
         <p:spPr>
+          <a:xfrm>
+            <a:off x="157075" y="920213"/>
+            <a:ext cx="8800501" cy="3706106"/>
+          </a:xfrm>
           <a:prstGeom prst="rect">
             <a:avLst/>
           </a:prstGeom>
@@ -7589,25 +8987,63 @@
           </a:bodyPr>
           <a:lstStyle/>
           <a:p>
-            <a:pPr marL="420623" indent="-373888" defTabSz="841247">
-              <a:buSzPts val="2500"/>
-              <a:defRPr sz="2576"/>
+            <a:pPr marL="0" indent="0" defTabSz="685800">
+              <a:buSzTx/>
+              <a:buNone/>
+              <a:defRPr sz="2100"/>
             </a:pPr>
             <a:r>
               <a:rPr lang="en-US" dirty="0"/>
-              <a:t>Text</a:t>
+              <a:t>Text here</a:t>
+            </a:r>
+            <a:r>
+              <a:rPr dirty="0"/>
+              <a:t>:</a:t>
+            </a:r>
+          </a:p>
+          <a:p>
+            <a:pPr marL="342900" indent="-304800" defTabSz="685800">
+              <a:buSzPts val="2100"/>
+              <a:defRPr sz="2100"/>
+            </a:pPr>
+            <a:r>
+              <a:rPr lang="en-US" b="1" dirty="0"/>
+              <a:t>Subtext</a:t>
             </a:r>
             <a:endParaRPr dirty="0"/>
           </a:p>
           <a:p>
-            <a:pPr marL="864616" lvl="1" indent="-373888" defTabSz="841247">
-              <a:buSzPts val="2500"/>
+            <a:pPr marL="704850" lvl="1" indent="-304800" defTabSz="685800">
+              <a:buSzPts val="2100"/>
               <a:buChar char="●"/>
-              <a:defRPr sz="2576"/>
+              <a:defRPr sz="2100"/>
             </a:pPr>
             <a:r>
               <a:rPr lang="en-US" dirty="0"/>
+              <a:t>Other Text</a:t>
+            </a:r>
+            <a:endParaRPr dirty="0"/>
+          </a:p>
+          <a:p>
+            <a:pPr marL="342900" indent="-304800" defTabSz="685800">
+              <a:buSzPts val="2100"/>
+              <a:defRPr sz="2100"/>
+            </a:pPr>
+            <a:r>
+              <a:rPr lang="en-US" b="1" dirty="0"/>
               <a:t>Subtext</a:t>
+            </a:r>
+            <a:endParaRPr dirty="0"/>
+          </a:p>
+          <a:p>
+            <a:pPr marL="704850" lvl="1" indent="-304800" defTabSz="685800">
+              <a:buSzPts val="2100"/>
+              <a:buChar char="●"/>
+              <a:defRPr sz="2100"/>
+            </a:pPr>
+            <a:r>
+              <a:rPr lang="en-US" dirty="0"/>
+              <a:t>Other Text</a:t>
             </a:r>
             <a:endParaRPr dirty="0"/>
           </a:p>
@@ -7641,7 +9077,7 @@
       </p:grpSpPr>
       <p:sp>
         <p:nvSpPr>
-          <p:cNvPr id="219" name="Purpose"/>
+          <p:cNvPr id="194" name="Introduction"/>
           <p:cNvSpPr txBox="1">
             <a:spLocks noGrp="1"/>
           </p:cNvSpPr>
@@ -7665,16 +9101,14 @@
           </a:lstStyle>
           <a:p>
             <a:r>
-              <a:rPr lang="en-US" dirty="0"/>
-              <a:t>Goal</a:t>
-            </a:r>
-            <a:endParaRPr dirty="0"/>
+              <a:t>Introduction</a:t>
+            </a:r>
           </a:p>
         </p:txBody>
       </p:sp>
       <p:sp>
         <p:nvSpPr>
-          <p:cNvPr id="220" name="New digital posters offer:…"/>
+          <p:cNvPr id="195" name="Welcome to the 2024 ISMRM in Singapore!…"/>
           <p:cNvSpPr txBox="1">
             <a:spLocks noGrp="1"/>
           </p:cNvSpPr>
@@ -7683,10 +9117,6 @@
           </p:nvPr>
         </p:nvSpPr>
         <p:spPr>
-          <a:xfrm>
-            <a:off x="157075" y="920213"/>
-            <a:ext cx="8800501" cy="3706106"/>
-          </a:xfrm>
           <a:prstGeom prst="rect">
             <a:avLst/>
           </a:prstGeom>
@@ -7697,74 +9127,31 @@
           </a:bodyPr>
           <a:lstStyle/>
           <a:p>
-            <a:pPr marL="0" indent="0" defTabSz="685800">
-              <a:buSzTx/>
-              <a:buNone/>
-              <a:defRPr sz="2100"/>
+            <a:pPr marL="420623" indent="-373888" defTabSz="841247">
+              <a:buSzPts val="2500"/>
+              <a:defRPr sz="2576"/>
             </a:pPr>
             <a:r>
               <a:rPr lang="en-US" dirty="0"/>
-              <a:t>Text here</a:t>
-            </a:r>
-            <a:r>
-              <a:rPr dirty="0"/>
-              <a:t>:</a:t>
-            </a:r>
-          </a:p>
-          <a:p>
-            <a:pPr marL="342900" indent="-304800" defTabSz="685800">
-              <a:buSzPts val="2100"/>
-              <a:defRPr sz="2100"/>
+              <a:t>Text</a:t>
+            </a:r>
+            <a:endParaRPr dirty="0"/>
+          </a:p>
+          <a:p>
+            <a:pPr marL="864616" lvl="1" indent="-373888" defTabSz="841247">
+              <a:buSzPts val="2500"/>
+              <a:buChar char="●"/>
+              <a:defRPr sz="2576"/>
             </a:pPr>
             <a:r>
-              <a:rPr lang="en-US" b="1" dirty="0"/>
+              <a:rPr lang="en-US" dirty="0"/>
               <a:t>Subtext</a:t>
             </a:r>
             <a:endParaRPr dirty="0"/>
           </a:p>
-          <a:p>
-            <a:pPr marL="704850" lvl="1" indent="-304800" defTabSz="685800">
-              <a:buSzPts val="2100"/>
-              <a:buChar char="●"/>
-              <a:defRPr sz="2100"/>
-            </a:pPr>
-            <a:r>
-              <a:rPr lang="en-US" dirty="0"/>
-              <a:t>Other Text</a:t>
-            </a:r>
-            <a:endParaRPr dirty="0"/>
-          </a:p>
-          <a:p>
-            <a:pPr marL="342900" indent="-304800" defTabSz="685800">
-              <a:buSzPts val="2100"/>
-              <a:defRPr sz="2100"/>
-            </a:pPr>
-            <a:r>
-              <a:rPr lang="en-US" b="1" dirty="0"/>
-              <a:t>Subtext</a:t>
-            </a:r>
-            <a:endParaRPr dirty="0"/>
-          </a:p>
-          <a:p>
-            <a:pPr marL="704850" lvl="1" indent="-304800" defTabSz="685800">
-              <a:buSzPts val="2100"/>
-              <a:buChar char="●"/>
-              <a:defRPr sz="2100"/>
-            </a:pPr>
-            <a:r>
-              <a:rPr lang="en-US" dirty="0"/>
-              <a:t>Other Text</a:t>
-            </a:r>
-            <a:endParaRPr dirty="0"/>
-          </a:p>
         </p:txBody>
       </p:sp>
     </p:spTree>
-    <p:extLst>
-      <p:ext uri="{BB962C8B-B14F-4D97-AF65-F5344CB8AC3E}">
-        <p14:creationId xmlns:p14="http://schemas.microsoft.com/office/powerpoint/2010/main" val="425676557"/>
-      </p:ext>
-    </p:extLst>
   </p:cSld>
   <p:clrMapOvr>
     <a:masterClrMapping/>
@@ -7792,7 +9179,7 @@
       </p:grpSpPr>
       <p:sp>
         <p:nvSpPr>
-          <p:cNvPr id="194" name="Introduction"/>
+          <p:cNvPr id="219" name="Purpose"/>
           <p:cNvSpPr txBox="1">
             <a:spLocks noGrp="1"/>
           </p:cNvSpPr>
@@ -7817,7 +9204,7 @@
           <a:p>
             <a:r>
               <a:rPr lang="en-US" dirty="0"/>
-              <a:t>Background Information</a:t>
+              <a:t>Goal</a:t>
             </a:r>
             <a:endParaRPr dirty="0"/>
           </a:p>
@@ -7825,7 +9212,7 @@
       </p:sp>
       <p:sp>
         <p:nvSpPr>
-          <p:cNvPr id="195" name="Welcome to the 2024 ISMRM in Singapore!…"/>
+          <p:cNvPr id="220" name="New digital posters offer:…"/>
           <p:cNvSpPr txBox="1">
             <a:spLocks noGrp="1"/>
           </p:cNvSpPr>
@@ -7834,6 +9221,10 @@
           </p:nvPr>
         </p:nvSpPr>
         <p:spPr>
+          <a:xfrm>
+            <a:off x="157075" y="920213"/>
+            <a:ext cx="8800501" cy="3706106"/>
+          </a:xfrm>
           <a:prstGeom prst="rect">
             <a:avLst/>
           </a:prstGeom>
@@ -7844,25 +9235,63 @@
           </a:bodyPr>
           <a:lstStyle/>
           <a:p>
-            <a:pPr marL="420623" indent="-373888" defTabSz="841247">
-              <a:buSzPts val="2500"/>
-              <a:defRPr sz="2576"/>
+            <a:pPr marL="0" indent="0" defTabSz="685800">
+              <a:buSzTx/>
+              <a:buNone/>
+              <a:defRPr sz="2100"/>
             </a:pPr>
             <a:r>
               <a:rPr lang="en-US" dirty="0"/>
-              <a:t>Text</a:t>
+              <a:t>Text here</a:t>
+            </a:r>
+            <a:r>
+              <a:rPr dirty="0"/>
+              <a:t>:</a:t>
+            </a:r>
+          </a:p>
+          <a:p>
+            <a:pPr marL="342900" indent="-304800" defTabSz="685800">
+              <a:buSzPts val="2100"/>
+              <a:defRPr sz="2100"/>
+            </a:pPr>
+            <a:r>
+              <a:rPr lang="en-US" b="1" dirty="0"/>
+              <a:t>Subtext</a:t>
             </a:r>
             <a:endParaRPr dirty="0"/>
           </a:p>
           <a:p>
-            <a:pPr marL="864616" lvl="1" indent="-373888" defTabSz="841247">
-              <a:buSzPts val="2500"/>
+            <a:pPr marL="704850" lvl="1" indent="-304800" defTabSz="685800">
+              <a:buSzPts val="2100"/>
               <a:buChar char="●"/>
-              <a:defRPr sz="2576"/>
+              <a:defRPr sz="2100"/>
             </a:pPr>
             <a:r>
               <a:rPr lang="en-US" dirty="0"/>
+              <a:t>Other Text</a:t>
+            </a:r>
+            <a:endParaRPr dirty="0"/>
+          </a:p>
+          <a:p>
+            <a:pPr marL="342900" indent="-304800" defTabSz="685800">
+              <a:buSzPts val="2100"/>
+              <a:defRPr sz="2100"/>
+            </a:pPr>
+            <a:r>
+              <a:rPr lang="en-US" b="1" dirty="0"/>
               <a:t>Subtext</a:t>
+            </a:r>
+            <a:endParaRPr dirty="0"/>
+          </a:p>
+          <a:p>
+            <a:pPr marL="704850" lvl="1" indent="-304800" defTabSz="685800">
+              <a:buSzPts val="2100"/>
+              <a:buChar char="●"/>
+              <a:defRPr sz="2100"/>
+            </a:pPr>
+            <a:r>
+              <a:rPr lang="en-US" dirty="0"/>
+              <a:t>Other Text</a:t>
             </a:r>
             <a:endParaRPr dirty="0"/>
           </a:p>
@@ -7871,7 +9300,7 @@
     </p:spTree>
     <p:extLst>
       <p:ext uri="{BB962C8B-B14F-4D97-AF65-F5344CB8AC3E}">
-        <p14:creationId xmlns:p14="http://schemas.microsoft.com/office/powerpoint/2010/main" val="3700227969"/>
+        <p14:creationId xmlns:p14="http://schemas.microsoft.com/office/powerpoint/2010/main" val="425676557"/>
       </p:ext>
     </p:extLst>
   </p:cSld>
@@ -7901,7 +9330,7 @@
       </p:grpSpPr>
       <p:sp>
         <p:nvSpPr>
-          <p:cNvPr id="219" name="Purpose"/>
+          <p:cNvPr id="194" name="Introduction"/>
           <p:cNvSpPr txBox="1">
             <a:spLocks noGrp="1"/>
           </p:cNvSpPr>
@@ -7926,7 +9355,7 @@
           <a:p>
             <a:r>
               <a:rPr lang="en-US" dirty="0"/>
-              <a:t>Approach</a:t>
+              <a:t>Background Information</a:t>
             </a:r>
             <a:endParaRPr dirty="0"/>
           </a:p>
@@ -7934,7 +9363,7 @@
       </p:sp>
       <p:sp>
         <p:nvSpPr>
-          <p:cNvPr id="220" name="New digital posters offer:…"/>
+          <p:cNvPr id="195" name="Welcome to the 2024 ISMRM in Singapore!…"/>
           <p:cNvSpPr txBox="1">
             <a:spLocks noGrp="1"/>
           </p:cNvSpPr>
@@ -7943,10 +9372,6 @@
           </p:nvPr>
         </p:nvSpPr>
         <p:spPr>
-          <a:xfrm>
-            <a:off x="157075" y="920213"/>
-            <a:ext cx="8800501" cy="3706106"/>
-          </a:xfrm>
           <a:prstGeom prst="rect">
             <a:avLst/>
           </a:prstGeom>
@@ -7957,63 +9382,25 @@
           </a:bodyPr>
           <a:lstStyle/>
           <a:p>
-            <a:pPr marL="0" indent="0" defTabSz="685800">
-              <a:buSzTx/>
-              <a:buNone/>
-              <a:defRPr sz="2100"/>
+            <a:pPr marL="420623" indent="-373888" defTabSz="841247">
+              <a:buSzPts val="2500"/>
+              <a:defRPr sz="2576"/>
             </a:pPr>
             <a:r>
               <a:rPr lang="en-US" dirty="0"/>
-              <a:t>Text here</a:t>
-            </a:r>
-            <a:r>
-              <a:rPr dirty="0"/>
-              <a:t>:</a:t>
-            </a:r>
-          </a:p>
-          <a:p>
-            <a:pPr marL="342900" indent="-304800" defTabSz="685800">
-              <a:buSzPts val="2100"/>
-              <a:defRPr sz="2100"/>
+              <a:t>Text</a:t>
+            </a:r>
+            <a:endParaRPr dirty="0"/>
+          </a:p>
+          <a:p>
+            <a:pPr marL="864616" lvl="1" indent="-373888" defTabSz="841247">
+              <a:buSzPts val="2500"/>
+              <a:buChar char="●"/>
+              <a:defRPr sz="2576"/>
             </a:pPr>
             <a:r>
-              <a:rPr lang="en-US" b="1" dirty="0"/>
+              <a:rPr lang="en-US" dirty="0"/>
               <a:t>Subtext</a:t>
-            </a:r>
-            <a:endParaRPr dirty="0"/>
-          </a:p>
-          <a:p>
-            <a:pPr marL="704850" lvl="1" indent="-304800" defTabSz="685800">
-              <a:buSzPts val="2100"/>
-              <a:buChar char="●"/>
-              <a:defRPr sz="2100"/>
-            </a:pPr>
-            <a:r>
-              <a:rPr lang="en-US" dirty="0"/>
-              <a:t>Other Text</a:t>
-            </a:r>
-            <a:endParaRPr dirty="0"/>
-          </a:p>
-          <a:p>
-            <a:pPr marL="342900" indent="-304800" defTabSz="685800">
-              <a:buSzPts val="2100"/>
-              <a:defRPr sz="2100"/>
-            </a:pPr>
-            <a:r>
-              <a:rPr lang="en-US" b="1" dirty="0"/>
-              <a:t>Subtext</a:t>
-            </a:r>
-            <a:endParaRPr dirty="0"/>
-          </a:p>
-          <a:p>
-            <a:pPr marL="704850" lvl="1" indent="-304800" defTabSz="685800">
-              <a:buSzPts val="2100"/>
-              <a:buChar char="●"/>
-              <a:defRPr sz="2100"/>
-            </a:pPr>
-            <a:r>
-              <a:rPr lang="en-US" dirty="0"/>
-              <a:t>Other Text</a:t>
             </a:r>
             <a:endParaRPr dirty="0"/>
           </a:p>
@@ -8022,7 +9409,7 @@
     </p:spTree>
     <p:extLst>
       <p:ext uri="{BB962C8B-B14F-4D97-AF65-F5344CB8AC3E}">
-        <p14:creationId xmlns:p14="http://schemas.microsoft.com/office/powerpoint/2010/main" val="881998998"/>
+        <p14:creationId xmlns:p14="http://schemas.microsoft.com/office/powerpoint/2010/main" val="3700227969"/>
       </p:ext>
     </p:extLst>
   </p:cSld>
@@ -8052,7 +9439,7 @@
       </p:grpSpPr>
       <p:sp>
         <p:nvSpPr>
-          <p:cNvPr id="194" name="Introduction"/>
+          <p:cNvPr id="219" name="Purpose"/>
           <p:cNvSpPr txBox="1">
             <a:spLocks noGrp="1"/>
           </p:cNvSpPr>
@@ -8077,7 +9464,7 @@
           <a:p>
             <a:r>
               <a:rPr lang="en-US" dirty="0"/>
-              <a:t>Theory</a:t>
+              <a:t>Approach</a:t>
             </a:r>
             <a:endParaRPr dirty="0"/>
           </a:p>
@@ -8085,7 +9472,7 @@
       </p:sp>
       <p:sp>
         <p:nvSpPr>
-          <p:cNvPr id="195" name="Welcome to the 2024 ISMRM in Singapore!…"/>
+          <p:cNvPr id="220" name="New digital posters offer:…"/>
           <p:cNvSpPr txBox="1">
             <a:spLocks noGrp="1"/>
           </p:cNvSpPr>
@@ -8094,6 +9481,10 @@
           </p:nvPr>
         </p:nvSpPr>
         <p:spPr>
+          <a:xfrm>
+            <a:off x="157075" y="920213"/>
+            <a:ext cx="8800501" cy="3706106"/>
+          </a:xfrm>
           <a:prstGeom prst="rect">
             <a:avLst/>
           </a:prstGeom>
@@ -8104,25 +9495,63 @@
           </a:bodyPr>
           <a:lstStyle/>
           <a:p>
-            <a:pPr marL="420623" indent="-373888" defTabSz="841247">
-              <a:buSzPts val="2500"/>
-              <a:defRPr sz="2576"/>
+            <a:pPr marL="0" indent="0" defTabSz="685800">
+              <a:buSzTx/>
+              <a:buNone/>
+              <a:defRPr sz="2100"/>
             </a:pPr>
             <a:r>
               <a:rPr lang="en-US" dirty="0"/>
-              <a:t>Text</a:t>
+              <a:t>Text here</a:t>
+            </a:r>
+            <a:r>
+              <a:rPr dirty="0"/>
+              <a:t>:</a:t>
+            </a:r>
+          </a:p>
+          <a:p>
+            <a:pPr marL="342900" indent="-304800" defTabSz="685800">
+              <a:buSzPts val="2100"/>
+              <a:defRPr sz="2100"/>
+            </a:pPr>
+            <a:r>
+              <a:rPr lang="en-US" b="1" dirty="0"/>
+              <a:t>Subtext</a:t>
             </a:r>
             <a:endParaRPr dirty="0"/>
           </a:p>
           <a:p>
-            <a:pPr marL="864616" lvl="1" indent="-373888" defTabSz="841247">
-              <a:buSzPts val="2500"/>
+            <a:pPr marL="704850" lvl="1" indent="-304800" defTabSz="685800">
+              <a:buSzPts val="2100"/>
               <a:buChar char="●"/>
-              <a:defRPr sz="2576"/>
+              <a:defRPr sz="2100"/>
             </a:pPr>
             <a:r>
               <a:rPr lang="en-US" dirty="0"/>
+              <a:t>Other Text</a:t>
+            </a:r>
+            <a:endParaRPr dirty="0"/>
+          </a:p>
+          <a:p>
+            <a:pPr marL="342900" indent="-304800" defTabSz="685800">
+              <a:buSzPts val="2100"/>
+              <a:defRPr sz="2100"/>
+            </a:pPr>
+            <a:r>
+              <a:rPr lang="en-US" b="1" dirty="0"/>
               <a:t>Subtext</a:t>
+            </a:r>
+            <a:endParaRPr dirty="0"/>
+          </a:p>
+          <a:p>
+            <a:pPr marL="704850" lvl="1" indent="-304800" defTabSz="685800">
+              <a:buSzPts val="2100"/>
+              <a:buChar char="●"/>
+              <a:defRPr sz="2100"/>
+            </a:pPr>
+            <a:r>
+              <a:rPr lang="en-US" dirty="0"/>
+              <a:t>Other Text</a:t>
             </a:r>
             <a:endParaRPr dirty="0"/>
           </a:p>
@@ -8131,7 +9560,7 @@
     </p:spTree>
     <p:extLst>
       <p:ext uri="{BB962C8B-B14F-4D97-AF65-F5344CB8AC3E}">
-        <p14:creationId xmlns:p14="http://schemas.microsoft.com/office/powerpoint/2010/main" val="136113324"/>
+        <p14:creationId xmlns:p14="http://schemas.microsoft.com/office/powerpoint/2010/main" val="881998998"/>
       </p:ext>
     </p:extLst>
   </p:cSld>

</xml_diff>